<commit_message>
Updated the MySQL Installation instruction.
</commit_message>
<xml_diff>
--- a/javadb/resources/Installing MySQL .pptx
+++ b/javadb/resources/Installing MySQL .pptx
@@ -4,6 +4,9 @@
   <p:sldMasterIdLst>
     <p:sldMasterId id="2147483648" r:id="rId1"/>
   </p:sldMasterIdLst>
+  <p:notesMasterIdLst>
+    <p:notesMasterId r:id="rId27"/>
+  </p:notesMasterIdLst>
   <p:sldIdLst>
     <p:sldId id="256" r:id="rId2"/>
     <p:sldId id="267" r:id="rId3"/>
@@ -16,7 +19,7 @@
     <p:sldId id="263" r:id="rId10"/>
     <p:sldId id="264" r:id="rId11"/>
     <p:sldId id="265" r:id="rId12"/>
-    <p:sldId id="266" r:id="rId13"/>
+    <p:sldId id="289" r:id="rId13"/>
     <p:sldId id="274" r:id="rId14"/>
     <p:sldId id="276" r:id="rId15"/>
     <p:sldId id="275" r:id="rId16"/>
@@ -29,8 +32,7 @@
     <p:sldId id="282" r:id="rId23"/>
     <p:sldId id="283" r:id="rId24"/>
     <p:sldId id="284" r:id="rId25"/>
-    <p:sldId id="287" r:id="rId26"/>
-    <p:sldId id="288" r:id="rId27"/>
+    <p:sldId id="288" r:id="rId26"/>
   </p:sldIdLst>
   <p:sldSz cx="12192000" cy="6858000"/>
   <p:notesSz cx="6858000" cy="9144000"/>
@@ -131,14 +133,641 @@
   </p:defaultTextStyle>
   <p:extLst>
     <p:ext uri="{EFAFB233-063F-42B5-8137-9DF3F51BA10A}">
-      <p15:sldGuideLst xmlns:p15="http://schemas.microsoft.com/office/powerpoint/2012/main"/>
+      <p15:sldGuideLst xmlns:p15="http://schemas.microsoft.com/office/powerpoint/2012/main">
+        <p15:guide id="1" orient="horz" pos="2160" userDrawn="1">
+          <p15:clr>
+            <a:srgbClr val="A4A3A4"/>
+          </p15:clr>
+        </p15:guide>
+        <p15:guide id="2" pos="3840" userDrawn="1">
+          <p15:clr>
+            <a:srgbClr val="A4A3A4"/>
+          </p15:clr>
+        </p15:guide>
+      </p15:sldGuideLst>
+    </p:ext>
+    <p:ext uri="{2D200454-40CA-4A62-9FC3-DE9A4176ACB9}">
+      <p15:notesGuideLst xmlns:p15="http://schemas.microsoft.com/office/powerpoint/2012/main"/>
     </p:ext>
   </p:extLst>
 </p:presentation>
 </file>
 
+<file path=ppt/commentAuthors.xml><?xml version="1.0" encoding="utf-8"?>
+<p:cmAuthorLst xmlns:a="http://schemas.openxmlformats.org/drawingml/2006/main" xmlns:r="http://schemas.openxmlformats.org/officeDocument/2006/relationships" xmlns:p="http://schemas.openxmlformats.org/presentationml/2006/main">
+  <p:cmAuthor id="1" name="Kovalenko, Inta" initials="KI" lastIdx="2" clrIdx="0">
+    <p:extLst>
+      <p:ext uri="{19B8F6BF-5375-455C-9EA6-DF929625EA0E}">
+        <p15:presenceInfo xmlns:p15="http://schemas.microsoft.com/office/powerpoint/2012/main" userId="S-1-5-21-329068152-1454471165-1417001333-5828728" providerId="AD"/>
+      </p:ext>
+    </p:extLst>
+  </p:cmAuthor>
+</p:cmAuthorLst>
+</file>
+
 <file path=ppt/revisionInfo.xml><?xml version="1.0" encoding="utf-8"?>
 <p1510:revInfo xmlns:a="http://schemas.openxmlformats.org/drawingml/2006/main" xmlns:r="http://schemas.openxmlformats.org/officeDocument/2006/relationships" xmlns:p1510="http://schemas.microsoft.com/office/powerpoint/2015/10/main"/>
+</file>
+
+<file path=ppt/notesMasters/notesMaster1.xml><?xml version="1.0" encoding="utf-8"?>
+<p:notesMaster xmlns:a="http://schemas.openxmlformats.org/drawingml/2006/main" xmlns:r="http://schemas.openxmlformats.org/officeDocument/2006/relationships" xmlns:p="http://schemas.openxmlformats.org/presentationml/2006/main">
+  <p:cSld>
+    <p:bg>
+      <p:bgRef idx="1001">
+        <a:schemeClr val="bg1"/>
+      </p:bgRef>
+    </p:bg>
+    <p:spTree>
+      <p:nvGrpSpPr>
+        <p:cNvPr id="1" name=""/>
+        <p:cNvGrpSpPr/>
+        <p:nvPr/>
+      </p:nvGrpSpPr>
+      <p:grpSpPr>
+        <a:xfrm>
+          <a:off x="0" y="0"/>
+          <a:ext cx="0" cy="0"/>
+          <a:chOff x="0" y="0"/>
+          <a:chExt cx="0" cy="0"/>
+        </a:xfrm>
+      </p:grpSpPr>
+      <p:sp>
+        <p:nvSpPr>
+          <p:cNvPr id="2" name="Header Placeholder 1"/>
+          <p:cNvSpPr>
+            <a:spLocks noGrp="1"/>
+          </p:cNvSpPr>
+          <p:nvPr>
+            <p:ph type="hdr" sz="quarter"/>
+          </p:nvPr>
+        </p:nvSpPr>
+        <p:spPr>
+          <a:xfrm>
+            <a:off x="0" y="0"/>
+            <a:ext cx="2971800" cy="458788"/>
+          </a:xfrm>
+          <a:prstGeom prst="rect">
+            <a:avLst/>
+          </a:prstGeom>
+        </p:spPr>
+        <p:txBody>
+          <a:bodyPr vert="horz" lIns="91440" tIns="45720" rIns="91440" bIns="45720" rtlCol="0"/>
+          <a:lstStyle>
+            <a:lvl1pPr algn="l">
+              <a:defRPr sz="1200"/>
+            </a:lvl1pPr>
+          </a:lstStyle>
+          <a:p>
+            <a:endParaRPr lang="en-US"/>
+          </a:p>
+        </p:txBody>
+      </p:sp>
+      <p:sp>
+        <p:nvSpPr>
+          <p:cNvPr id="3" name="Date Placeholder 2"/>
+          <p:cNvSpPr>
+            <a:spLocks noGrp="1"/>
+          </p:cNvSpPr>
+          <p:nvPr>
+            <p:ph type="dt" idx="1"/>
+          </p:nvPr>
+        </p:nvSpPr>
+        <p:spPr>
+          <a:xfrm>
+            <a:off x="3884613" y="0"/>
+            <a:ext cx="2971800" cy="458788"/>
+          </a:xfrm>
+          <a:prstGeom prst="rect">
+            <a:avLst/>
+          </a:prstGeom>
+        </p:spPr>
+        <p:txBody>
+          <a:bodyPr vert="horz" lIns="91440" tIns="45720" rIns="91440" bIns="45720" rtlCol="0"/>
+          <a:lstStyle>
+            <a:lvl1pPr algn="r">
+              <a:defRPr sz="1200"/>
+            </a:lvl1pPr>
+          </a:lstStyle>
+          <a:p>
+            <a:fld id="{824501AB-6149-40A7-88F9-26E7015C45C4}" type="datetimeFigureOut">
+              <a:rPr lang="en-US" smtClean="0"/>
+              <a:t>1/2/2018</a:t>
+            </a:fld>
+            <a:endParaRPr lang="en-US"/>
+          </a:p>
+        </p:txBody>
+      </p:sp>
+      <p:sp>
+        <p:nvSpPr>
+          <p:cNvPr id="4" name="Slide Image Placeholder 3"/>
+          <p:cNvSpPr>
+            <a:spLocks noGrp="1" noRot="1" noChangeAspect="1"/>
+          </p:cNvSpPr>
+          <p:nvPr>
+            <p:ph type="sldImg" idx="2"/>
+          </p:nvPr>
+        </p:nvSpPr>
+        <p:spPr>
+          <a:xfrm>
+            <a:off x="685800" y="1143000"/>
+            <a:ext cx="5486400" cy="3086100"/>
+          </a:xfrm>
+          <a:prstGeom prst="rect">
+            <a:avLst/>
+          </a:prstGeom>
+          <a:noFill/>
+          <a:ln w="12700">
+            <a:solidFill>
+              <a:prstClr val="black"/>
+            </a:solidFill>
+          </a:ln>
+        </p:spPr>
+        <p:txBody>
+          <a:bodyPr vert="horz" lIns="91440" tIns="45720" rIns="91440" bIns="45720" rtlCol="0" anchor="ctr"/>
+          <a:lstStyle/>
+          <a:p>
+            <a:endParaRPr lang="en-US"/>
+          </a:p>
+        </p:txBody>
+      </p:sp>
+      <p:sp>
+        <p:nvSpPr>
+          <p:cNvPr id="5" name="Notes Placeholder 4"/>
+          <p:cNvSpPr>
+            <a:spLocks noGrp="1"/>
+          </p:cNvSpPr>
+          <p:nvPr>
+            <p:ph type="body" sz="quarter" idx="3"/>
+          </p:nvPr>
+        </p:nvSpPr>
+        <p:spPr>
+          <a:xfrm>
+            <a:off x="685800" y="4400550"/>
+            <a:ext cx="5486400" cy="3600450"/>
+          </a:xfrm>
+          <a:prstGeom prst="rect">
+            <a:avLst/>
+          </a:prstGeom>
+        </p:spPr>
+        <p:txBody>
+          <a:bodyPr vert="horz" lIns="91440" tIns="45720" rIns="91440" bIns="45720" rtlCol="0"/>
+          <a:lstStyle/>
+          <a:p>
+            <a:pPr lvl="0"/>
+            <a:r>
+              <a:rPr lang="en-US"/>
+              <a:t>Edit Master text styles</a:t>
+            </a:r>
+          </a:p>
+          <a:p>
+            <a:pPr lvl="1"/>
+            <a:r>
+              <a:rPr lang="en-US"/>
+              <a:t>Second level</a:t>
+            </a:r>
+          </a:p>
+          <a:p>
+            <a:pPr lvl="2"/>
+            <a:r>
+              <a:rPr lang="en-US"/>
+              <a:t>Third level</a:t>
+            </a:r>
+          </a:p>
+          <a:p>
+            <a:pPr lvl="3"/>
+            <a:r>
+              <a:rPr lang="en-US"/>
+              <a:t>Fourth level</a:t>
+            </a:r>
+          </a:p>
+          <a:p>
+            <a:pPr lvl="4"/>
+            <a:r>
+              <a:rPr lang="en-US"/>
+              <a:t>Fifth level</a:t>
+            </a:r>
+          </a:p>
+        </p:txBody>
+      </p:sp>
+      <p:sp>
+        <p:nvSpPr>
+          <p:cNvPr id="6" name="Footer Placeholder 5"/>
+          <p:cNvSpPr>
+            <a:spLocks noGrp="1"/>
+          </p:cNvSpPr>
+          <p:nvPr>
+            <p:ph type="ftr" sz="quarter" idx="4"/>
+          </p:nvPr>
+        </p:nvSpPr>
+        <p:spPr>
+          <a:xfrm>
+            <a:off x="0" y="8685213"/>
+            <a:ext cx="2971800" cy="458787"/>
+          </a:xfrm>
+          <a:prstGeom prst="rect">
+            <a:avLst/>
+          </a:prstGeom>
+        </p:spPr>
+        <p:txBody>
+          <a:bodyPr vert="horz" lIns="91440" tIns="45720" rIns="91440" bIns="45720" rtlCol="0" anchor="b"/>
+          <a:lstStyle>
+            <a:lvl1pPr algn="l">
+              <a:defRPr sz="1200"/>
+            </a:lvl1pPr>
+          </a:lstStyle>
+          <a:p>
+            <a:endParaRPr lang="en-US"/>
+          </a:p>
+        </p:txBody>
+      </p:sp>
+      <p:sp>
+        <p:nvSpPr>
+          <p:cNvPr id="7" name="Slide Number Placeholder 6"/>
+          <p:cNvSpPr>
+            <a:spLocks noGrp="1"/>
+          </p:cNvSpPr>
+          <p:nvPr>
+            <p:ph type="sldNum" sz="quarter" idx="5"/>
+          </p:nvPr>
+        </p:nvSpPr>
+        <p:spPr>
+          <a:xfrm>
+            <a:off x="3884613" y="8685213"/>
+            <a:ext cx="2971800" cy="458787"/>
+          </a:xfrm>
+          <a:prstGeom prst="rect">
+            <a:avLst/>
+          </a:prstGeom>
+        </p:spPr>
+        <p:txBody>
+          <a:bodyPr vert="horz" lIns="91440" tIns="45720" rIns="91440" bIns="45720" rtlCol="0" anchor="b"/>
+          <a:lstStyle>
+            <a:lvl1pPr algn="r">
+              <a:defRPr sz="1200"/>
+            </a:lvl1pPr>
+          </a:lstStyle>
+          <a:p>
+            <a:fld id="{5B5DFEB9-490C-4B39-AA37-5A3343F268BC}" type="slidenum">
+              <a:rPr lang="en-US" smtClean="0"/>
+              <a:t>‹#›</a:t>
+            </a:fld>
+            <a:endParaRPr lang="en-US"/>
+          </a:p>
+        </p:txBody>
+      </p:sp>
+    </p:spTree>
+    <p:extLst>
+      <p:ext uri="{BB962C8B-B14F-4D97-AF65-F5344CB8AC3E}">
+        <p14:creationId xmlns:p14="http://schemas.microsoft.com/office/powerpoint/2010/main" val="3927321436"/>
+      </p:ext>
+    </p:extLst>
+  </p:cSld>
+  <p:clrMap bg1="lt1" tx1="dk1" bg2="lt2" tx2="dk2" accent1="accent1" accent2="accent2" accent3="accent3" accent4="accent4" accent5="accent5" accent6="accent6" hlink="hlink" folHlink="folHlink"/>
+  <p:notesStyle>
+    <a:lvl1pPr marL="0" algn="l" defTabSz="914400" rtl="0" eaLnBrk="1" latinLnBrk="0" hangingPunct="1">
+      <a:defRPr sz="1200" kern="1200">
+        <a:solidFill>
+          <a:schemeClr val="tx1"/>
+        </a:solidFill>
+        <a:latin typeface="+mn-lt"/>
+        <a:ea typeface="+mn-ea"/>
+        <a:cs typeface="+mn-cs"/>
+      </a:defRPr>
+    </a:lvl1pPr>
+    <a:lvl2pPr marL="457200" algn="l" defTabSz="914400" rtl="0" eaLnBrk="1" latinLnBrk="0" hangingPunct="1">
+      <a:defRPr sz="1200" kern="1200">
+        <a:solidFill>
+          <a:schemeClr val="tx1"/>
+        </a:solidFill>
+        <a:latin typeface="+mn-lt"/>
+        <a:ea typeface="+mn-ea"/>
+        <a:cs typeface="+mn-cs"/>
+      </a:defRPr>
+    </a:lvl2pPr>
+    <a:lvl3pPr marL="914400" algn="l" defTabSz="914400" rtl="0" eaLnBrk="1" latinLnBrk="0" hangingPunct="1">
+      <a:defRPr sz="1200" kern="1200">
+        <a:solidFill>
+          <a:schemeClr val="tx1"/>
+        </a:solidFill>
+        <a:latin typeface="+mn-lt"/>
+        <a:ea typeface="+mn-ea"/>
+        <a:cs typeface="+mn-cs"/>
+      </a:defRPr>
+    </a:lvl3pPr>
+    <a:lvl4pPr marL="1371600" algn="l" defTabSz="914400" rtl="0" eaLnBrk="1" latinLnBrk="0" hangingPunct="1">
+      <a:defRPr sz="1200" kern="1200">
+        <a:solidFill>
+          <a:schemeClr val="tx1"/>
+        </a:solidFill>
+        <a:latin typeface="+mn-lt"/>
+        <a:ea typeface="+mn-ea"/>
+        <a:cs typeface="+mn-cs"/>
+      </a:defRPr>
+    </a:lvl4pPr>
+    <a:lvl5pPr marL="1828800" algn="l" defTabSz="914400" rtl="0" eaLnBrk="1" latinLnBrk="0" hangingPunct="1">
+      <a:defRPr sz="1200" kern="1200">
+        <a:solidFill>
+          <a:schemeClr val="tx1"/>
+        </a:solidFill>
+        <a:latin typeface="+mn-lt"/>
+        <a:ea typeface="+mn-ea"/>
+        <a:cs typeface="+mn-cs"/>
+      </a:defRPr>
+    </a:lvl5pPr>
+    <a:lvl6pPr marL="2286000" algn="l" defTabSz="914400" rtl="0" eaLnBrk="1" latinLnBrk="0" hangingPunct="1">
+      <a:defRPr sz="1200" kern="1200">
+        <a:solidFill>
+          <a:schemeClr val="tx1"/>
+        </a:solidFill>
+        <a:latin typeface="+mn-lt"/>
+        <a:ea typeface="+mn-ea"/>
+        <a:cs typeface="+mn-cs"/>
+      </a:defRPr>
+    </a:lvl6pPr>
+    <a:lvl7pPr marL="2743200" algn="l" defTabSz="914400" rtl="0" eaLnBrk="1" latinLnBrk="0" hangingPunct="1">
+      <a:defRPr sz="1200" kern="1200">
+        <a:solidFill>
+          <a:schemeClr val="tx1"/>
+        </a:solidFill>
+        <a:latin typeface="+mn-lt"/>
+        <a:ea typeface="+mn-ea"/>
+        <a:cs typeface="+mn-cs"/>
+      </a:defRPr>
+    </a:lvl7pPr>
+    <a:lvl8pPr marL="3200400" algn="l" defTabSz="914400" rtl="0" eaLnBrk="1" latinLnBrk="0" hangingPunct="1">
+      <a:defRPr sz="1200" kern="1200">
+        <a:solidFill>
+          <a:schemeClr val="tx1"/>
+        </a:solidFill>
+        <a:latin typeface="+mn-lt"/>
+        <a:ea typeface="+mn-ea"/>
+        <a:cs typeface="+mn-cs"/>
+      </a:defRPr>
+    </a:lvl8pPr>
+    <a:lvl9pPr marL="3657600" algn="l" defTabSz="914400" rtl="0" eaLnBrk="1" latinLnBrk="0" hangingPunct="1">
+      <a:defRPr sz="1200" kern="1200">
+        <a:solidFill>
+          <a:schemeClr val="tx1"/>
+        </a:solidFill>
+        <a:latin typeface="+mn-lt"/>
+        <a:ea typeface="+mn-ea"/>
+        <a:cs typeface="+mn-cs"/>
+      </a:defRPr>
+    </a:lvl9pPr>
+  </p:notesStyle>
+</p:notesMaster>
+</file>
+
+<file path=ppt/notesSlides/notesSlide1.xml><?xml version="1.0" encoding="utf-8"?>
+<p:notes xmlns:a="http://schemas.openxmlformats.org/drawingml/2006/main" xmlns:r="http://schemas.openxmlformats.org/officeDocument/2006/relationships" xmlns:p="http://schemas.openxmlformats.org/presentationml/2006/main">
+  <p:cSld>
+    <p:spTree>
+      <p:nvGrpSpPr>
+        <p:cNvPr id="1" name=""/>
+        <p:cNvGrpSpPr/>
+        <p:nvPr/>
+      </p:nvGrpSpPr>
+      <p:grpSpPr>
+        <a:xfrm>
+          <a:off x="0" y="0"/>
+          <a:ext cx="0" cy="0"/>
+          <a:chOff x="0" y="0"/>
+          <a:chExt cx="0" cy="0"/>
+        </a:xfrm>
+      </p:grpSpPr>
+      <p:sp>
+        <p:nvSpPr>
+          <p:cNvPr id="2" name="Slide Image Placeholder 1"/>
+          <p:cNvSpPr>
+            <a:spLocks noGrp="1" noRot="1" noChangeAspect="1"/>
+          </p:cNvSpPr>
+          <p:nvPr>
+            <p:ph type="sldImg"/>
+          </p:nvPr>
+        </p:nvSpPr>
+        <p:spPr/>
+      </p:sp>
+      <p:sp>
+        <p:nvSpPr>
+          <p:cNvPr id="3" name="Notes Placeholder 2"/>
+          <p:cNvSpPr>
+            <a:spLocks noGrp="1"/>
+          </p:cNvSpPr>
+          <p:nvPr>
+            <p:ph type="body" idx="1"/>
+          </p:nvPr>
+        </p:nvSpPr>
+        <p:spPr/>
+        <p:txBody>
+          <a:bodyPr/>
+          <a:lstStyle/>
+          <a:p>
+            <a:endParaRPr lang="en-US" dirty="0"/>
+          </a:p>
+        </p:txBody>
+      </p:sp>
+      <p:sp>
+        <p:nvSpPr>
+          <p:cNvPr id="4" name="Slide Number Placeholder 3"/>
+          <p:cNvSpPr>
+            <a:spLocks noGrp="1"/>
+          </p:cNvSpPr>
+          <p:nvPr>
+            <p:ph type="sldNum" sz="quarter" idx="10"/>
+          </p:nvPr>
+        </p:nvSpPr>
+        <p:spPr/>
+        <p:txBody>
+          <a:bodyPr/>
+          <a:lstStyle/>
+          <a:p>
+            <a:fld id="{5B5DFEB9-490C-4B39-AA37-5A3343F268BC}" type="slidenum">
+              <a:rPr lang="en-US" smtClean="0"/>
+              <a:t>1</a:t>
+            </a:fld>
+            <a:endParaRPr lang="en-US"/>
+          </a:p>
+        </p:txBody>
+      </p:sp>
+    </p:spTree>
+    <p:extLst>
+      <p:ext uri="{BB962C8B-B14F-4D97-AF65-F5344CB8AC3E}">
+        <p14:creationId xmlns:p14="http://schemas.microsoft.com/office/powerpoint/2010/main" val="3606546611"/>
+      </p:ext>
+    </p:extLst>
+  </p:cSld>
+  <p:clrMapOvr>
+    <a:masterClrMapping/>
+  </p:clrMapOvr>
+</p:notes>
+</file>
+
+<file path=ppt/notesSlides/notesSlide2.xml><?xml version="1.0" encoding="utf-8"?>
+<p:notes xmlns:a="http://schemas.openxmlformats.org/drawingml/2006/main" xmlns:r="http://schemas.openxmlformats.org/officeDocument/2006/relationships" xmlns:p="http://schemas.openxmlformats.org/presentationml/2006/main">
+  <p:cSld>
+    <p:spTree>
+      <p:nvGrpSpPr>
+        <p:cNvPr id="1" name=""/>
+        <p:cNvGrpSpPr/>
+        <p:nvPr/>
+      </p:nvGrpSpPr>
+      <p:grpSpPr>
+        <a:xfrm>
+          <a:off x="0" y="0"/>
+          <a:ext cx="0" cy="0"/>
+          <a:chOff x="0" y="0"/>
+          <a:chExt cx="0" cy="0"/>
+        </a:xfrm>
+      </p:grpSpPr>
+      <p:sp>
+        <p:nvSpPr>
+          <p:cNvPr id="2" name="Slide Image Placeholder 1"/>
+          <p:cNvSpPr>
+            <a:spLocks noGrp="1" noRot="1" noChangeAspect="1"/>
+          </p:cNvSpPr>
+          <p:nvPr>
+            <p:ph type="sldImg"/>
+          </p:nvPr>
+        </p:nvSpPr>
+        <p:spPr/>
+      </p:sp>
+      <p:sp>
+        <p:nvSpPr>
+          <p:cNvPr id="3" name="Notes Placeholder 2"/>
+          <p:cNvSpPr>
+            <a:spLocks noGrp="1"/>
+          </p:cNvSpPr>
+          <p:nvPr>
+            <p:ph type="body" idx="1"/>
+          </p:nvPr>
+        </p:nvSpPr>
+        <p:spPr/>
+        <p:txBody>
+          <a:bodyPr/>
+          <a:lstStyle/>
+          <a:p>
+            <a:endParaRPr lang="en-US" dirty="0"/>
+          </a:p>
+        </p:txBody>
+      </p:sp>
+      <p:sp>
+        <p:nvSpPr>
+          <p:cNvPr id="4" name="Slide Number Placeholder 3"/>
+          <p:cNvSpPr>
+            <a:spLocks noGrp="1"/>
+          </p:cNvSpPr>
+          <p:nvPr>
+            <p:ph type="sldNum" sz="quarter" idx="10"/>
+          </p:nvPr>
+        </p:nvSpPr>
+        <p:spPr/>
+        <p:txBody>
+          <a:bodyPr/>
+          <a:lstStyle/>
+          <a:p>
+            <a:fld id="{5B5DFEB9-490C-4B39-AA37-5A3343F268BC}" type="slidenum">
+              <a:rPr lang="en-US" smtClean="0"/>
+              <a:t>2</a:t>
+            </a:fld>
+            <a:endParaRPr lang="en-US"/>
+          </a:p>
+        </p:txBody>
+      </p:sp>
+    </p:spTree>
+    <p:extLst>
+      <p:ext uri="{BB962C8B-B14F-4D97-AF65-F5344CB8AC3E}">
+        <p14:creationId xmlns:p14="http://schemas.microsoft.com/office/powerpoint/2010/main" val="4099537343"/>
+      </p:ext>
+    </p:extLst>
+  </p:cSld>
+  <p:clrMapOvr>
+    <a:masterClrMapping/>
+  </p:clrMapOvr>
+</p:notes>
+</file>
+
+<file path=ppt/notesSlides/notesSlide3.xml><?xml version="1.0" encoding="utf-8"?>
+<p:notes xmlns:a="http://schemas.openxmlformats.org/drawingml/2006/main" xmlns:r="http://schemas.openxmlformats.org/officeDocument/2006/relationships" xmlns:p="http://schemas.openxmlformats.org/presentationml/2006/main">
+  <p:cSld>
+    <p:spTree>
+      <p:nvGrpSpPr>
+        <p:cNvPr id="1" name=""/>
+        <p:cNvGrpSpPr/>
+        <p:nvPr/>
+      </p:nvGrpSpPr>
+      <p:grpSpPr>
+        <a:xfrm>
+          <a:off x="0" y="0"/>
+          <a:ext cx="0" cy="0"/>
+          <a:chOff x="0" y="0"/>
+          <a:chExt cx="0" cy="0"/>
+        </a:xfrm>
+      </p:grpSpPr>
+      <p:sp>
+        <p:nvSpPr>
+          <p:cNvPr id="2" name="Slide Image Placeholder 1"/>
+          <p:cNvSpPr>
+            <a:spLocks noGrp="1" noRot="1" noChangeAspect="1"/>
+          </p:cNvSpPr>
+          <p:nvPr>
+            <p:ph type="sldImg"/>
+          </p:nvPr>
+        </p:nvSpPr>
+        <p:spPr/>
+      </p:sp>
+      <p:sp>
+        <p:nvSpPr>
+          <p:cNvPr id="3" name="Notes Placeholder 2"/>
+          <p:cNvSpPr>
+            <a:spLocks noGrp="1"/>
+          </p:cNvSpPr>
+          <p:nvPr>
+            <p:ph type="body" idx="1"/>
+          </p:nvPr>
+        </p:nvSpPr>
+        <p:spPr/>
+        <p:txBody>
+          <a:bodyPr/>
+          <a:lstStyle/>
+          <a:p>
+            <a:endParaRPr lang="en-US" dirty="0"/>
+          </a:p>
+        </p:txBody>
+      </p:sp>
+      <p:sp>
+        <p:nvSpPr>
+          <p:cNvPr id="4" name="Slide Number Placeholder 3"/>
+          <p:cNvSpPr>
+            <a:spLocks noGrp="1"/>
+          </p:cNvSpPr>
+          <p:nvPr>
+            <p:ph type="sldNum" sz="quarter" idx="10"/>
+          </p:nvPr>
+        </p:nvSpPr>
+        <p:spPr/>
+        <p:txBody>
+          <a:bodyPr/>
+          <a:lstStyle/>
+          <a:p>
+            <a:fld id="{5B5DFEB9-490C-4B39-AA37-5A3343F268BC}" type="slidenum">
+              <a:rPr lang="en-US" smtClean="0"/>
+              <a:t>12</a:t>
+            </a:fld>
+            <a:endParaRPr lang="en-US"/>
+          </a:p>
+        </p:txBody>
+      </p:sp>
+    </p:spTree>
+    <p:extLst>
+      <p:ext uri="{BB962C8B-B14F-4D97-AF65-F5344CB8AC3E}">
+        <p14:creationId xmlns:p14="http://schemas.microsoft.com/office/powerpoint/2010/main" val="2499283554"/>
+      </p:ext>
+    </p:extLst>
+  </p:cSld>
+  <p:clrMapOvr>
+    <a:masterClrMapping/>
+  </p:clrMapOvr>
+</p:notes>
 </file>
 
 <file path=ppt/slideLayouts/slideLayout1.xml><?xml version="1.0" encoding="utf-8"?>
@@ -288,7 +917,7 @@
           <a:p>
             <a:fld id="{A7A22941-BA0D-4150-A135-FDA72BB250B8}" type="datetimeFigureOut">
               <a:rPr lang="en-US" smtClean="0"/>
-              <a:t>12/22/2017</a:t>
+              <a:t>1/2/2018</a:t>
             </a:fld>
             <a:endParaRPr lang="en-US"/>
           </a:p>
@@ -486,7 +1115,7 @@
           <a:p>
             <a:fld id="{A7A22941-BA0D-4150-A135-FDA72BB250B8}" type="datetimeFigureOut">
               <a:rPr lang="en-US" smtClean="0"/>
-              <a:t>12/22/2017</a:t>
+              <a:t>1/2/2018</a:t>
             </a:fld>
             <a:endParaRPr lang="en-US"/>
           </a:p>
@@ -694,7 +1323,7 @@
           <a:p>
             <a:fld id="{A7A22941-BA0D-4150-A135-FDA72BB250B8}" type="datetimeFigureOut">
               <a:rPr lang="en-US" smtClean="0"/>
-              <a:t>12/22/2017</a:t>
+              <a:t>1/2/2018</a:t>
             </a:fld>
             <a:endParaRPr lang="en-US"/>
           </a:p>
@@ -892,7 +1521,7 @@
           <a:p>
             <a:fld id="{A7A22941-BA0D-4150-A135-FDA72BB250B8}" type="datetimeFigureOut">
               <a:rPr lang="en-US" smtClean="0"/>
-              <a:t>12/22/2017</a:t>
+              <a:t>1/2/2018</a:t>
             </a:fld>
             <a:endParaRPr lang="en-US"/>
           </a:p>
@@ -1167,7 +1796,7 @@
           <a:p>
             <a:fld id="{A7A22941-BA0D-4150-A135-FDA72BB250B8}" type="datetimeFigureOut">
               <a:rPr lang="en-US" smtClean="0"/>
-              <a:t>12/22/2017</a:t>
+              <a:t>1/2/2018</a:t>
             </a:fld>
             <a:endParaRPr lang="en-US"/>
           </a:p>
@@ -1432,7 +2061,7 @@
           <a:p>
             <a:fld id="{A7A22941-BA0D-4150-A135-FDA72BB250B8}" type="datetimeFigureOut">
               <a:rPr lang="en-US" smtClean="0"/>
-              <a:t>12/22/2017</a:t>
+              <a:t>1/2/2018</a:t>
             </a:fld>
             <a:endParaRPr lang="en-US"/>
           </a:p>
@@ -1844,7 +2473,7 @@
           <a:p>
             <a:fld id="{A7A22941-BA0D-4150-A135-FDA72BB250B8}" type="datetimeFigureOut">
               <a:rPr lang="en-US" smtClean="0"/>
-              <a:t>12/22/2017</a:t>
+              <a:t>1/2/2018</a:t>
             </a:fld>
             <a:endParaRPr lang="en-US"/>
           </a:p>
@@ -1985,7 +2614,7 @@
           <a:p>
             <a:fld id="{A7A22941-BA0D-4150-A135-FDA72BB250B8}" type="datetimeFigureOut">
               <a:rPr lang="en-US" smtClean="0"/>
-              <a:t>12/22/2017</a:t>
+              <a:t>1/2/2018</a:t>
             </a:fld>
             <a:endParaRPr lang="en-US"/>
           </a:p>
@@ -2098,7 +2727,7 @@
           <a:p>
             <a:fld id="{A7A22941-BA0D-4150-A135-FDA72BB250B8}" type="datetimeFigureOut">
               <a:rPr lang="en-US" smtClean="0"/>
-              <a:t>12/22/2017</a:t>
+              <a:t>1/2/2018</a:t>
             </a:fld>
             <a:endParaRPr lang="en-US"/>
           </a:p>
@@ -2409,7 +3038,7 @@
           <a:p>
             <a:fld id="{A7A22941-BA0D-4150-A135-FDA72BB250B8}" type="datetimeFigureOut">
               <a:rPr lang="en-US" smtClean="0"/>
-              <a:t>12/22/2017</a:t>
+              <a:t>1/2/2018</a:t>
             </a:fld>
             <a:endParaRPr lang="en-US"/>
           </a:p>
@@ -2697,7 +3326,7 @@
           <a:p>
             <a:fld id="{A7A22941-BA0D-4150-A135-FDA72BB250B8}" type="datetimeFigureOut">
               <a:rPr lang="en-US" smtClean="0"/>
-              <a:t>12/22/2017</a:t>
+              <a:t>1/2/2018</a:t>
             </a:fld>
             <a:endParaRPr lang="en-US"/>
           </a:p>
@@ -2938,7 +3567,7 @@
           <a:p>
             <a:fld id="{A7A22941-BA0D-4150-A135-FDA72BB250B8}" type="datetimeFigureOut">
               <a:rPr lang="en-US" smtClean="0"/>
-              <a:t>12/22/2017</a:t>
+              <a:t>1/2/2018</a:t>
             </a:fld>
             <a:endParaRPr lang="en-US"/>
           </a:p>
@@ -3453,10 +4082,10 @@
       </p:grpSpPr>
       <p:pic>
         <p:nvPicPr>
-          <p:cNvPr id="10" name="Picture 9">
-            <a:extLst>
-              <a:ext uri="{FF2B5EF4-FFF2-40B4-BE49-F238E27FC236}">
-                <a16:creationId xmlns:a16="http://schemas.microsoft.com/office/drawing/2014/main" id="{05807986-CA35-452C-B6D0-60B36D1C7E83}"/>
+          <p:cNvPr id="4" name="Picture 3">
+            <a:extLst>
+              <a:ext uri="{FF2B5EF4-FFF2-40B4-BE49-F238E27FC236}">
+                <a16:creationId xmlns:a16="http://schemas.microsoft.com/office/drawing/2014/main" id="{02121B62-517A-47CB-A97E-F41301417908}"/>
               </a:ext>
             </a:extLst>
           </p:cNvPr>
@@ -3473,8 +4102,8 @@
         </p:blipFill>
         <p:spPr>
           <a:xfrm>
-            <a:off x="5047994" y="1707937"/>
-            <a:ext cx="6562309" cy="5000985"/>
+            <a:off x="5116945" y="1804030"/>
+            <a:ext cx="6453044" cy="4859700"/>
           </a:xfrm>
           <a:prstGeom prst="rect">
             <a:avLst/>
@@ -3559,9 +4188,10 @@
               <a:rPr lang="lv-LV" dirty="0"/>
             </a:br>
             <a:r>
-              <a:rPr lang="lv-LV" dirty="0"/>
-              <a:t>«I accept the licence terms»</a:t>
-            </a:r>
+              <a:rPr lang="lv-LV" i="1" dirty="0"/>
+              <a:t>I accept the licence terms</a:t>
+            </a:r>
+            <a:endParaRPr lang="lv-LV" dirty="0"/>
           </a:p>
           <a:p>
             <a:pPr marL="0" indent="0">
@@ -3575,8 +4205,12 @@
               <a:rPr lang="lv-LV" dirty="0"/>
             </a:br>
             <a:r>
+              <a:rPr lang="lv-LV" i="1" dirty="0"/>
+              <a:t>Next</a:t>
+            </a:r>
+            <a:r>
               <a:rPr lang="lv-LV" dirty="0"/>
-              <a:t>«Next».</a:t>
+              <a:t>.</a:t>
             </a:r>
             <a:endParaRPr lang="en-US" dirty="0"/>
           </a:p>
@@ -3694,144 +4328,12 @@
           <a:chExt cx="0" cy="0"/>
         </a:xfrm>
       </p:grpSpPr>
-      <p:sp>
-        <p:nvSpPr>
-          <p:cNvPr id="2" name="Title 1">
-            <a:extLst>
-              <a:ext uri="{FF2B5EF4-FFF2-40B4-BE49-F238E27FC236}">
-                <a16:creationId xmlns:a16="http://schemas.microsoft.com/office/drawing/2014/main" id="{5418354D-7C44-4F3E-9820-4D741EA23442}"/>
-              </a:ext>
-            </a:extLst>
-          </p:cNvPr>
-          <p:cNvSpPr>
-            <a:spLocks noGrp="1"/>
-          </p:cNvSpPr>
-          <p:nvPr>
-            <p:ph type="title"/>
-          </p:nvPr>
-        </p:nvSpPr>
-        <p:spPr/>
-        <p:txBody>
-          <a:bodyPr/>
-          <a:lstStyle/>
-          <a:p>
-            <a:r>
-              <a:rPr lang="en-US" dirty="0"/>
-              <a:t>2</a:t>
-            </a:r>
-            <a:r>
-              <a:rPr lang="lv-LV" dirty="0"/>
-              <a:t>.</a:t>
-            </a:r>
-            <a:r>
-              <a:rPr lang="en-US" dirty="0"/>
-              <a:t>5.</a:t>
-            </a:r>
-            <a:r>
-              <a:rPr lang="lv-LV" dirty="0"/>
-              <a:t> Choose a Setup Type</a:t>
-            </a:r>
-            <a:endParaRPr lang="en-US" dirty="0"/>
-          </a:p>
-        </p:txBody>
-      </p:sp>
-      <p:sp>
-        <p:nvSpPr>
-          <p:cNvPr id="3" name="Content Placeholder 2">
-            <a:extLst>
-              <a:ext uri="{FF2B5EF4-FFF2-40B4-BE49-F238E27FC236}">
-                <a16:creationId xmlns:a16="http://schemas.microsoft.com/office/drawing/2014/main" id="{3D98D749-5ECA-48D3-B0F0-7F40CE74E935}"/>
-              </a:ext>
-            </a:extLst>
-          </p:cNvPr>
-          <p:cNvSpPr>
-            <a:spLocks noGrp="1"/>
-          </p:cNvSpPr>
-          <p:nvPr>
-            <p:ph idx="1"/>
-          </p:nvPr>
-        </p:nvSpPr>
-        <p:spPr>
-          <a:xfrm>
-            <a:off x="838200" y="1825625"/>
-            <a:ext cx="4113362" cy="4351338"/>
-          </a:xfrm>
-        </p:spPr>
-        <p:txBody>
-          <a:bodyPr>
-            <a:normAutofit/>
-          </a:bodyPr>
-          <a:lstStyle/>
-          <a:p>
-            <a:pPr marL="0" indent="0">
-              <a:buNone/>
-            </a:pPr>
-            <a:r>
-              <a:rPr lang="en-US" dirty="0"/>
-              <a:t>To ease the installation and acquire most of the components:</a:t>
-            </a:r>
-          </a:p>
-          <a:p>
-            <a:r>
-              <a:rPr lang="en-US" dirty="0"/>
-              <a:t>Choose </a:t>
-            </a:r>
-            <a:r>
-              <a:rPr lang="en-US" i="1" dirty="0"/>
-              <a:t>Developer Default</a:t>
-            </a:r>
-            <a:r>
-              <a:rPr lang="en-US" dirty="0"/>
-              <a:t>, click </a:t>
-            </a:r>
-            <a:r>
-              <a:rPr lang="en-US" i="1" dirty="0"/>
-              <a:t>Next</a:t>
-            </a:r>
-            <a:r>
-              <a:rPr lang="en-US" dirty="0"/>
-              <a:t>, and click </a:t>
-            </a:r>
-            <a:r>
-              <a:rPr lang="en-US" i="1" dirty="0"/>
-              <a:t>Back;</a:t>
-            </a:r>
-          </a:p>
-          <a:p>
-            <a:r>
-              <a:rPr lang="en-US" dirty="0"/>
-              <a:t>Then c</a:t>
-            </a:r>
-            <a:r>
-              <a:rPr lang="lv-LV" dirty="0"/>
-              <a:t>hoose </a:t>
-            </a:r>
-            <a:r>
-              <a:rPr lang="en-US" i="1" dirty="0"/>
-              <a:t>Custom</a:t>
-            </a:r>
-            <a:r>
-              <a:rPr lang="en-US" dirty="0"/>
-              <a:t> and click </a:t>
-            </a:r>
-            <a:r>
-              <a:rPr lang="en-US" i="1" dirty="0"/>
-              <a:t>Next</a:t>
-            </a:r>
-            <a:r>
-              <a:rPr lang="lv-LV" dirty="0"/>
-              <a:t>.</a:t>
-            </a:r>
-            <a:endParaRPr lang="en-US" dirty="0"/>
-          </a:p>
-        </p:txBody>
-      </p:sp>
       <p:pic>
         <p:nvPicPr>
-          <p:cNvPr id="5" name="Picture 4">
-            <a:extLst>
-              <a:ext uri="{FF2B5EF4-FFF2-40B4-BE49-F238E27FC236}">
-                <a16:creationId xmlns:a16="http://schemas.microsoft.com/office/drawing/2014/main" id="{76CFAC59-8D7E-42CC-8EA3-B46D66F464F2}"/>
+          <p:cNvPr id="8" name="Picture 7">
+            <a:extLst>
+              <a:ext uri="{FF2B5EF4-FFF2-40B4-BE49-F238E27FC236}">
+                <a16:creationId xmlns:a16="http://schemas.microsoft.com/office/drawing/2014/main" id="{1AB52FAF-0E96-4D0C-8387-97BFBE9E06F9}"/>
               </a:ext>
             </a:extLst>
           </p:cNvPr>
@@ -3848,14 +4350,110 @@
         </p:blipFill>
         <p:spPr>
           <a:xfrm>
-            <a:off x="5055079" y="1690688"/>
-            <a:ext cx="6584919" cy="5035994"/>
+            <a:off x="5090609" y="1779441"/>
+            <a:ext cx="6519494" cy="4919472"/>
           </a:xfrm>
           <a:prstGeom prst="rect">
             <a:avLst/>
           </a:prstGeom>
         </p:spPr>
       </p:pic>
+      <p:sp>
+        <p:nvSpPr>
+          <p:cNvPr id="2" name="Title 1">
+            <a:extLst>
+              <a:ext uri="{FF2B5EF4-FFF2-40B4-BE49-F238E27FC236}">
+                <a16:creationId xmlns:a16="http://schemas.microsoft.com/office/drawing/2014/main" id="{5418354D-7C44-4F3E-9820-4D741EA23442}"/>
+              </a:ext>
+            </a:extLst>
+          </p:cNvPr>
+          <p:cNvSpPr>
+            <a:spLocks noGrp="1"/>
+          </p:cNvSpPr>
+          <p:nvPr>
+            <p:ph type="title"/>
+          </p:nvPr>
+        </p:nvSpPr>
+        <p:spPr/>
+        <p:txBody>
+          <a:bodyPr/>
+          <a:lstStyle/>
+          <a:p>
+            <a:r>
+              <a:rPr lang="en-US" dirty="0"/>
+              <a:t>2</a:t>
+            </a:r>
+            <a:r>
+              <a:rPr lang="lv-LV" dirty="0"/>
+              <a:t>.</a:t>
+            </a:r>
+            <a:r>
+              <a:rPr lang="en-US" dirty="0"/>
+              <a:t>5.</a:t>
+            </a:r>
+            <a:r>
+              <a:rPr lang="lv-LV" dirty="0"/>
+              <a:t> Choose a Setup Type</a:t>
+            </a:r>
+            <a:endParaRPr lang="en-US" dirty="0"/>
+          </a:p>
+        </p:txBody>
+      </p:sp>
+      <p:sp>
+        <p:nvSpPr>
+          <p:cNvPr id="3" name="Content Placeholder 2">
+            <a:extLst>
+              <a:ext uri="{FF2B5EF4-FFF2-40B4-BE49-F238E27FC236}">
+                <a16:creationId xmlns:a16="http://schemas.microsoft.com/office/drawing/2014/main" id="{3D98D749-5ECA-48D3-B0F0-7F40CE74E935}"/>
+              </a:ext>
+            </a:extLst>
+          </p:cNvPr>
+          <p:cNvSpPr>
+            <a:spLocks noGrp="1"/>
+          </p:cNvSpPr>
+          <p:nvPr>
+            <p:ph idx="1"/>
+          </p:nvPr>
+        </p:nvSpPr>
+        <p:spPr>
+          <a:xfrm>
+            <a:off x="838200" y="1825625"/>
+            <a:ext cx="4113362" cy="4351338"/>
+          </a:xfrm>
+        </p:spPr>
+        <p:txBody>
+          <a:bodyPr>
+            <a:normAutofit/>
+          </a:bodyPr>
+          <a:lstStyle/>
+          <a:p>
+            <a:pPr marL="0" indent="0">
+              <a:buNone/>
+            </a:pPr>
+            <a:r>
+              <a:rPr lang="lv-LV" dirty="0"/>
+              <a:t>Choose </a:t>
+            </a:r>
+            <a:r>
+              <a:rPr lang="en-US" i="1" dirty="0"/>
+              <a:t>Custom</a:t>
+            </a:r>
+            <a:r>
+              <a:rPr lang="en-US" dirty="0"/>
+              <a:t> and click </a:t>
+            </a:r>
+            <a:r>
+              <a:rPr lang="en-US" i="1" dirty="0"/>
+              <a:t>Next</a:t>
+            </a:r>
+            <a:r>
+              <a:rPr lang="lv-LV" dirty="0"/>
+              <a:t>.</a:t>
+            </a:r>
+            <a:endParaRPr lang="en-US" dirty="0"/>
+          </a:p>
+        </p:txBody>
+      </p:sp>
       <p:pic>
         <p:nvPicPr>
           <p:cNvPr id="6" name="Graphic 5" descr="Line Arrow: Slight curve">
@@ -3973,7 +4571,7 @@
           <p:cNvPr id="2" name="Title 1">
             <a:extLst>
               <a:ext uri="{FF2B5EF4-FFF2-40B4-BE49-F238E27FC236}">
-                <a16:creationId xmlns:a16="http://schemas.microsoft.com/office/drawing/2014/main" id="{049A1C41-EA2D-4A30-B109-E6E80831866F}"/>
+                <a16:creationId xmlns:a16="http://schemas.microsoft.com/office/drawing/2014/main" id="{59D65B69-09B9-4097-AB15-4A5F58FC5B89}"/>
               </a:ext>
             </a:extLst>
           </p:cNvPr>
@@ -3991,285 +4589,160 @@
           <a:p>
             <a:r>
               <a:rPr lang="en-US" dirty="0"/>
-              <a:t>2.6. Deselect unneeded components</a:t>
-            </a:r>
+              <a:t>2</a:t>
+            </a:r>
+            <a:r>
+              <a:rPr lang="lv-LV" dirty="0"/>
+              <a:t>.6</a:t>
+            </a:r>
+            <a:r>
+              <a:rPr lang="en-US" dirty="0"/>
+              <a:t>.</a:t>
+            </a:r>
+            <a:r>
+              <a:rPr lang="lv-LV" dirty="0"/>
+              <a:t> Select Products and Features</a:t>
+            </a:r>
+            <a:endParaRPr lang="en-US" dirty="0"/>
+          </a:p>
+        </p:txBody>
+      </p:sp>
+      <p:sp>
+        <p:nvSpPr>
+          <p:cNvPr id="3" name="Content Placeholder 2">
+            <a:extLst>
+              <a:ext uri="{FF2B5EF4-FFF2-40B4-BE49-F238E27FC236}">
+                <a16:creationId xmlns:a16="http://schemas.microsoft.com/office/drawing/2014/main" id="{67CBDC4A-D3AF-4F32-9440-718DF43193AD}"/>
+              </a:ext>
+            </a:extLst>
+          </p:cNvPr>
+          <p:cNvSpPr>
+            <a:spLocks noGrp="1"/>
+          </p:cNvSpPr>
+          <p:nvPr>
+            <p:ph idx="1"/>
+          </p:nvPr>
+        </p:nvSpPr>
+        <p:spPr>
+          <a:xfrm>
+            <a:off x="838201" y="1825625"/>
+            <a:ext cx="4290934" cy="4351338"/>
+          </a:xfrm>
+        </p:spPr>
+        <p:txBody>
+          <a:bodyPr/>
+          <a:lstStyle/>
+          <a:p>
+            <a:pPr marL="0" indent="0">
+              <a:buNone/>
+            </a:pPr>
+            <a:r>
+              <a:rPr lang="lv-LV" dirty="0"/>
+              <a:t>Select to install:</a:t>
+            </a:r>
+          </a:p>
+          <a:p>
+            <a:r>
+              <a:rPr lang="lv-LV" sz="2000" i="1" dirty="0"/>
+              <a:t>MySQL Server 5.7.20 – X86</a:t>
+            </a:r>
+            <a:r>
+              <a:rPr lang="lv-LV" sz="2000" dirty="0"/>
+              <a:t>;</a:t>
+            </a:r>
+          </a:p>
+          <a:p>
+            <a:r>
+              <a:rPr lang="lv-LV" sz="2000" i="1" dirty="0"/>
+              <a:t>MySQL Workbench 6.3.10 – X86</a:t>
+            </a:r>
+            <a:r>
+              <a:rPr lang="lv-LV" sz="2000" dirty="0"/>
+              <a:t>;</a:t>
+            </a:r>
+          </a:p>
+          <a:p>
+            <a:r>
+              <a:rPr lang="lv-LV" sz="2000" i="1" dirty="0"/>
+              <a:t>MySQL Notifier 1.1.7 – X86</a:t>
+            </a:r>
+            <a:r>
+              <a:rPr lang="lv-LV" sz="2000" dirty="0"/>
+              <a:t>;</a:t>
+            </a:r>
+          </a:p>
+          <a:p>
+            <a:r>
+              <a:rPr lang="lv-LV" sz="2000" i="1" dirty="0"/>
+              <a:t>MySQL Shell 1.0.11 – X86</a:t>
+            </a:r>
+            <a:r>
+              <a:rPr lang="lv-LV" sz="2000" dirty="0"/>
+              <a:t>;</a:t>
+            </a:r>
+          </a:p>
+          <a:p>
+            <a:r>
+              <a:rPr lang="lv-LV" sz="2000" i="1" dirty="0"/>
+              <a:t>Connector/J 5.1.45 – X86.</a:t>
+            </a:r>
+          </a:p>
+          <a:p>
+            <a:pPr marL="0" indent="0">
+              <a:buNone/>
+            </a:pPr>
+            <a:endParaRPr lang="lv-LV" sz="2000" i="1" dirty="0"/>
+          </a:p>
+          <a:p>
+            <a:pPr marL="0" indent="0">
+              <a:buNone/>
+            </a:pPr>
+            <a:r>
+              <a:rPr lang="lv-LV" dirty="0"/>
+              <a:t>Click </a:t>
+            </a:r>
+            <a:r>
+              <a:rPr lang="lv-LV" i="1" dirty="0"/>
+              <a:t>Next.</a:t>
+            </a:r>
+            <a:endParaRPr lang="en-US" dirty="0"/>
           </a:p>
         </p:txBody>
       </p:sp>
       <p:pic>
         <p:nvPicPr>
-          <p:cNvPr id="6" name="Content Placeholder 5">
-            <a:extLst>
-              <a:ext uri="{FF2B5EF4-FFF2-40B4-BE49-F238E27FC236}">
-                <a16:creationId xmlns:a16="http://schemas.microsoft.com/office/drawing/2014/main" id="{E5371696-D001-48EA-8809-CBE5B51EB839}"/>
+          <p:cNvPr id="7" name="Picture 6">
+            <a:extLst>
+              <a:ext uri="{FF2B5EF4-FFF2-40B4-BE49-F238E27FC236}">
+                <a16:creationId xmlns:a16="http://schemas.microsoft.com/office/drawing/2014/main" id="{704DC579-A0F2-4B34-A6E3-605BF4241F4E}"/>
               </a:ext>
             </a:extLst>
           </p:cNvPr>
           <p:cNvPicPr>
-            <a:picLocks noGrp="1" noChangeAspect="1"/>
+            <a:picLocks noChangeAspect="1"/>
           </p:cNvPicPr>
-          <p:nvPr>
-            <p:ph idx="1"/>
-          </p:nvPr>
+          <p:nvPr/>
         </p:nvPicPr>
         <p:blipFill>
-          <a:blip r:embed="rId2">
-            <a:extLst>
-              <a:ext uri="{28A0092B-C50C-407E-A947-70E740481C1C}">
-                <a14:useLocalDpi xmlns:a14="http://schemas.microsoft.com/office/drawing/2010/main" val="0"/>
-              </a:ext>
-            </a:extLst>
-          </a:blip>
+          <a:blip r:embed="rId3"/>
           <a:stretch>
             <a:fillRect/>
           </a:stretch>
         </p:blipFill>
         <p:spPr>
           <a:xfrm>
-            <a:off x="5088562" y="1751070"/>
-            <a:ext cx="6480251" cy="4899894"/>
-          </a:xfrm>
-        </p:spPr>
-      </p:pic>
-      <p:sp>
-        <p:nvSpPr>
-          <p:cNvPr id="7" name="Content Placeholder 2">
-            <a:extLst>
-              <a:ext uri="{FF2B5EF4-FFF2-40B4-BE49-F238E27FC236}">
-                <a16:creationId xmlns:a16="http://schemas.microsoft.com/office/drawing/2014/main" id="{4785E90F-8EC4-4BE0-AEED-6302F7F66A2B}"/>
-              </a:ext>
-            </a:extLst>
-          </p:cNvPr>
-          <p:cNvSpPr txBox="1">
-            <a:spLocks/>
-          </p:cNvSpPr>
-          <p:nvPr/>
-        </p:nvSpPr>
-        <p:spPr>
-          <a:xfrm>
-            <a:off x="838200" y="1825625"/>
-            <a:ext cx="4113362" cy="4351338"/>
+            <a:off x="5120509" y="1808373"/>
+            <a:ext cx="6437883" cy="4846320"/>
           </a:xfrm>
           <a:prstGeom prst="rect">
             <a:avLst/>
           </a:prstGeom>
         </p:spPr>
-        <p:txBody>
-          <a:bodyPr vert="horz" lIns="91440" tIns="45720" rIns="91440" bIns="45720" rtlCol="0">
-            <a:normAutofit/>
-          </a:bodyPr>
-          <a:lstStyle>
-            <a:lvl1pPr marL="228600" indent="-228600" algn="l" defTabSz="914400" rtl="0" eaLnBrk="1" latinLnBrk="0" hangingPunct="1">
-              <a:lnSpc>
-                <a:spcPct val="90000"/>
-              </a:lnSpc>
-              <a:spcBef>
-                <a:spcPts val="1000"/>
-              </a:spcBef>
-              <a:buFont typeface="Arial" panose="020B0604020202020204" pitchFamily="34" charset="0"/>
-              <a:buChar char="•"/>
-              <a:defRPr sz="2800" kern="1200">
-                <a:solidFill>
-                  <a:schemeClr val="tx1"/>
-                </a:solidFill>
-                <a:latin typeface="+mn-lt"/>
-                <a:ea typeface="+mn-ea"/>
-                <a:cs typeface="+mn-cs"/>
-              </a:defRPr>
-            </a:lvl1pPr>
-            <a:lvl2pPr marL="685800" indent="-228600" algn="l" defTabSz="914400" rtl="0" eaLnBrk="1" latinLnBrk="0" hangingPunct="1">
-              <a:lnSpc>
-                <a:spcPct val="90000"/>
-              </a:lnSpc>
-              <a:spcBef>
-                <a:spcPts val="500"/>
-              </a:spcBef>
-              <a:buFont typeface="Arial" panose="020B0604020202020204" pitchFamily="34" charset="0"/>
-              <a:buChar char="•"/>
-              <a:defRPr sz="2400" kern="1200">
-                <a:solidFill>
-                  <a:schemeClr val="tx1"/>
-                </a:solidFill>
-                <a:latin typeface="+mn-lt"/>
-                <a:ea typeface="+mn-ea"/>
-                <a:cs typeface="+mn-cs"/>
-              </a:defRPr>
-            </a:lvl2pPr>
-            <a:lvl3pPr marL="1143000" indent="-228600" algn="l" defTabSz="914400" rtl="0" eaLnBrk="1" latinLnBrk="0" hangingPunct="1">
-              <a:lnSpc>
-                <a:spcPct val="90000"/>
-              </a:lnSpc>
-              <a:spcBef>
-                <a:spcPts val="500"/>
-              </a:spcBef>
-              <a:buFont typeface="Arial" panose="020B0604020202020204" pitchFamily="34" charset="0"/>
-              <a:buChar char="•"/>
-              <a:defRPr sz="2000" kern="1200">
-                <a:solidFill>
-                  <a:schemeClr val="tx1"/>
-                </a:solidFill>
-                <a:latin typeface="+mn-lt"/>
-                <a:ea typeface="+mn-ea"/>
-                <a:cs typeface="+mn-cs"/>
-              </a:defRPr>
-            </a:lvl3pPr>
-            <a:lvl4pPr marL="1600200" indent="-228600" algn="l" defTabSz="914400" rtl="0" eaLnBrk="1" latinLnBrk="0" hangingPunct="1">
-              <a:lnSpc>
-                <a:spcPct val="90000"/>
-              </a:lnSpc>
-              <a:spcBef>
-                <a:spcPts val="500"/>
-              </a:spcBef>
-              <a:buFont typeface="Arial" panose="020B0604020202020204" pitchFamily="34" charset="0"/>
-              <a:buChar char="•"/>
-              <a:defRPr sz="1800" kern="1200">
-                <a:solidFill>
-                  <a:schemeClr val="tx1"/>
-                </a:solidFill>
-                <a:latin typeface="+mn-lt"/>
-                <a:ea typeface="+mn-ea"/>
-                <a:cs typeface="+mn-cs"/>
-              </a:defRPr>
-            </a:lvl4pPr>
-            <a:lvl5pPr marL="2057400" indent="-228600" algn="l" defTabSz="914400" rtl="0" eaLnBrk="1" latinLnBrk="0" hangingPunct="1">
-              <a:lnSpc>
-                <a:spcPct val="90000"/>
-              </a:lnSpc>
-              <a:spcBef>
-                <a:spcPts val="500"/>
-              </a:spcBef>
-              <a:buFont typeface="Arial" panose="020B0604020202020204" pitchFamily="34" charset="0"/>
-              <a:buChar char="•"/>
-              <a:defRPr sz="1800" kern="1200">
-                <a:solidFill>
-                  <a:schemeClr val="tx1"/>
-                </a:solidFill>
-                <a:latin typeface="+mn-lt"/>
-                <a:ea typeface="+mn-ea"/>
-                <a:cs typeface="+mn-cs"/>
-              </a:defRPr>
-            </a:lvl5pPr>
-            <a:lvl6pPr marL="2514600" indent="-228600" algn="l" defTabSz="914400" rtl="0" eaLnBrk="1" latinLnBrk="0" hangingPunct="1">
-              <a:lnSpc>
-                <a:spcPct val="90000"/>
-              </a:lnSpc>
-              <a:spcBef>
-                <a:spcPts val="500"/>
-              </a:spcBef>
-              <a:buFont typeface="Arial" panose="020B0604020202020204" pitchFamily="34" charset="0"/>
-              <a:buChar char="•"/>
-              <a:defRPr sz="1800" kern="1200">
-                <a:solidFill>
-                  <a:schemeClr val="tx1"/>
-                </a:solidFill>
-                <a:latin typeface="+mn-lt"/>
-                <a:ea typeface="+mn-ea"/>
-                <a:cs typeface="+mn-cs"/>
-              </a:defRPr>
-            </a:lvl6pPr>
-            <a:lvl7pPr marL="2971800" indent="-228600" algn="l" defTabSz="914400" rtl="0" eaLnBrk="1" latinLnBrk="0" hangingPunct="1">
-              <a:lnSpc>
-                <a:spcPct val="90000"/>
-              </a:lnSpc>
-              <a:spcBef>
-                <a:spcPts val="500"/>
-              </a:spcBef>
-              <a:buFont typeface="Arial" panose="020B0604020202020204" pitchFamily="34" charset="0"/>
-              <a:buChar char="•"/>
-              <a:defRPr sz="1800" kern="1200">
-                <a:solidFill>
-                  <a:schemeClr val="tx1"/>
-                </a:solidFill>
-                <a:latin typeface="+mn-lt"/>
-                <a:ea typeface="+mn-ea"/>
-                <a:cs typeface="+mn-cs"/>
-              </a:defRPr>
-            </a:lvl7pPr>
-            <a:lvl8pPr marL="3429000" indent="-228600" algn="l" defTabSz="914400" rtl="0" eaLnBrk="1" latinLnBrk="0" hangingPunct="1">
-              <a:lnSpc>
-                <a:spcPct val="90000"/>
-              </a:lnSpc>
-              <a:spcBef>
-                <a:spcPts val="500"/>
-              </a:spcBef>
-              <a:buFont typeface="Arial" panose="020B0604020202020204" pitchFamily="34" charset="0"/>
-              <a:buChar char="•"/>
-              <a:defRPr sz="1800" kern="1200">
-                <a:solidFill>
-                  <a:schemeClr val="tx1"/>
-                </a:solidFill>
-                <a:latin typeface="+mn-lt"/>
-                <a:ea typeface="+mn-ea"/>
-                <a:cs typeface="+mn-cs"/>
-              </a:defRPr>
-            </a:lvl8pPr>
-            <a:lvl9pPr marL="3886200" indent="-228600" algn="l" defTabSz="914400" rtl="0" eaLnBrk="1" latinLnBrk="0" hangingPunct="1">
-              <a:lnSpc>
-                <a:spcPct val="90000"/>
-              </a:lnSpc>
-              <a:spcBef>
-                <a:spcPts val="500"/>
-              </a:spcBef>
-              <a:buFont typeface="Arial" panose="020B0604020202020204" pitchFamily="34" charset="0"/>
-              <a:buChar char="•"/>
-              <a:defRPr sz="1800" kern="1200">
-                <a:solidFill>
-                  <a:schemeClr val="tx1"/>
-                </a:solidFill>
-                <a:latin typeface="+mn-lt"/>
-                <a:ea typeface="+mn-ea"/>
-                <a:cs typeface="+mn-cs"/>
-              </a:defRPr>
-            </a:lvl9pPr>
-          </a:lstStyle>
-          <a:p>
-            <a:pPr marL="0" indent="0">
-              <a:buFont typeface="Arial" panose="020B0604020202020204" pitchFamily="34" charset="0"/>
-              <a:buNone/>
-            </a:pPr>
-            <a:r>
-              <a:rPr lang="en-US" dirty="0"/>
-              <a:t>Deselect unneeded components:</a:t>
-            </a:r>
-          </a:p>
-          <a:p>
-            <a:r>
-              <a:rPr lang="en-US" dirty="0"/>
-              <a:t>MySQL For Excel;</a:t>
-            </a:r>
-          </a:p>
-          <a:p>
-            <a:r>
-              <a:rPr lang="en-US" dirty="0"/>
-              <a:t>MySQL for Visual Studio;</a:t>
-            </a:r>
-          </a:p>
-          <a:p>
-            <a:r>
-              <a:rPr lang="en-US" dirty="0"/>
-              <a:t>Connector/NET;</a:t>
-            </a:r>
-          </a:p>
-          <a:p>
-            <a:r>
-              <a:rPr lang="en-US" dirty="0"/>
-              <a:t>Connector/</a:t>
-            </a:r>
-            <a:r>
-              <a:rPr lang="en-US" dirty="0" err="1"/>
-              <a:t>Phyton</a:t>
-            </a:r>
-            <a:r>
-              <a:rPr lang="en-US" dirty="0"/>
-              <a:t>.</a:t>
-            </a:r>
-          </a:p>
-        </p:txBody>
-      </p:sp>
+      </p:pic>
     </p:spTree>
     <p:extLst>
       <p:ext uri="{BB962C8B-B14F-4D97-AF65-F5344CB8AC3E}">
-        <p14:creationId xmlns:p14="http://schemas.microsoft.com/office/powerpoint/2010/main" val="2795172100"/>
+        <p14:creationId xmlns:p14="http://schemas.microsoft.com/office/powerpoint/2010/main" val="608551405"/>
       </p:ext>
     </p:extLst>
   </p:cSld>
@@ -4296,81 +4769,12 @@
           <a:chExt cx="0" cy="0"/>
         </a:xfrm>
       </p:grpSpPr>
-      <p:sp>
-        <p:nvSpPr>
-          <p:cNvPr id="2" name="Title 1">
-            <a:extLst>
-              <a:ext uri="{FF2B5EF4-FFF2-40B4-BE49-F238E27FC236}">
-                <a16:creationId xmlns:a16="http://schemas.microsoft.com/office/drawing/2014/main" id="{53D714FD-B924-44CC-86F3-DBC651B9E0FF}"/>
-              </a:ext>
-            </a:extLst>
-          </p:cNvPr>
-          <p:cNvSpPr>
-            <a:spLocks noGrp="1"/>
-          </p:cNvSpPr>
-          <p:nvPr>
-            <p:ph type="title"/>
-          </p:nvPr>
-        </p:nvSpPr>
-        <p:spPr/>
-        <p:txBody>
-          <a:bodyPr/>
-          <a:lstStyle/>
-          <a:p>
-            <a:r>
-              <a:rPr lang="en-US" dirty="0"/>
-              <a:t>2.7. Install packages</a:t>
-            </a:r>
-          </a:p>
-        </p:txBody>
-      </p:sp>
-      <p:sp>
-        <p:nvSpPr>
-          <p:cNvPr id="3" name="Content Placeholder 2">
-            <a:extLst>
-              <a:ext uri="{FF2B5EF4-FFF2-40B4-BE49-F238E27FC236}">
-                <a16:creationId xmlns:a16="http://schemas.microsoft.com/office/drawing/2014/main" id="{12FCAD22-0244-4C26-8BFB-A2A7B100B146}"/>
-              </a:ext>
-            </a:extLst>
-          </p:cNvPr>
-          <p:cNvSpPr>
-            <a:spLocks noGrp="1"/>
-          </p:cNvSpPr>
-          <p:nvPr>
-            <p:ph idx="1"/>
-          </p:nvPr>
-        </p:nvSpPr>
-        <p:spPr>
-          <a:xfrm>
-            <a:off x="838200" y="1825625"/>
-            <a:ext cx="4303143" cy="4351338"/>
-          </a:xfrm>
-        </p:spPr>
-        <p:txBody>
-          <a:bodyPr/>
-          <a:lstStyle/>
-          <a:p>
-            <a:r>
-              <a:rPr lang="en-US" dirty="0"/>
-              <a:t>Click </a:t>
-            </a:r>
-            <a:r>
-              <a:rPr lang="en-US" i="1" dirty="0"/>
-              <a:t>Execute</a:t>
-            </a:r>
-            <a:r>
-              <a:rPr lang="en-US" dirty="0"/>
-              <a:t> to install the chosen packages.</a:t>
-            </a:r>
-          </a:p>
-        </p:txBody>
-      </p:sp>
       <p:pic>
         <p:nvPicPr>
-          <p:cNvPr id="4" name="Picture 3">
-            <a:extLst>
-              <a:ext uri="{FF2B5EF4-FFF2-40B4-BE49-F238E27FC236}">
-                <a16:creationId xmlns:a16="http://schemas.microsoft.com/office/drawing/2014/main" id="{715F0AB5-A534-4B5B-9744-048AE888E80D}"/>
+          <p:cNvPr id="6" name="Picture 5">
+            <a:extLst>
+              <a:ext uri="{FF2B5EF4-FFF2-40B4-BE49-F238E27FC236}">
+                <a16:creationId xmlns:a16="http://schemas.microsoft.com/office/drawing/2014/main" id="{4196DBDE-DECC-461C-AF5E-BD1423454693}"/>
               </a:ext>
             </a:extLst>
           </p:cNvPr>
@@ -4387,14 +4791,91 @@
         </p:blipFill>
         <p:spPr>
           <a:xfrm>
-            <a:off x="5029198" y="1699311"/>
-            <a:ext cx="6590582" cy="5000299"/>
+            <a:off x="5132717" y="1808373"/>
+            <a:ext cx="6424563" cy="4846320"/>
           </a:xfrm>
           <a:prstGeom prst="rect">
             <a:avLst/>
           </a:prstGeom>
         </p:spPr>
       </p:pic>
+      <p:sp>
+        <p:nvSpPr>
+          <p:cNvPr id="2" name="Title 1">
+            <a:extLst>
+              <a:ext uri="{FF2B5EF4-FFF2-40B4-BE49-F238E27FC236}">
+                <a16:creationId xmlns:a16="http://schemas.microsoft.com/office/drawing/2014/main" id="{53D714FD-B924-44CC-86F3-DBC651B9E0FF}"/>
+              </a:ext>
+            </a:extLst>
+          </p:cNvPr>
+          <p:cNvSpPr>
+            <a:spLocks noGrp="1"/>
+          </p:cNvSpPr>
+          <p:nvPr>
+            <p:ph type="title"/>
+          </p:nvPr>
+        </p:nvSpPr>
+        <p:spPr/>
+        <p:txBody>
+          <a:bodyPr/>
+          <a:lstStyle/>
+          <a:p>
+            <a:r>
+              <a:rPr lang="en-US" dirty="0"/>
+              <a:t>2.</a:t>
+            </a:r>
+            <a:r>
+              <a:rPr lang="lv-LV" dirty="0"/>
+              <a:t>7</a:t>
+            </a:r>
+            <a:r>
+              <a:rPr lang="en-US" dirty="0"/>
+              <a:t>. Install packages</a:t>
+            </a:r>
+          </a:p>
+        </p:txBody>
+      </p:sp>
+      <p:sp>
+        <p:nvSpPr>
+          <p:cNvPr id="3" name="Content Placeholder 2">
+            <a:extLst>
+              <a:ext uri="{FF2B5EF4-FFF2-40B4-BE49-F238E27FC236}">
+                <a16:creationId xmlns:a16="http://schemas.microsoft.com/office/drawing/2014/main" id="{12FCAD22-0244-4C26-8BFB-A2A7B100B146}"/>
+              </a:ext>
+            </a:extLst>
+          </p:cNvPr>
+          <p:cNvSpPr>
+            <a:spLocks noGrp="1"/>
+          </p:cNvSpPr>
+          <p:nvPr>
+            <p:ph idx="1"/>
+          </p:nvPr>
+        </p:nvSpPr>
+        <p:spPr>
+          <a:xfrm>
+            <a:off x="838200" y="1825625"/>
+            <a:ext cx="4303143" cy="4351338"/>
+          </a:xfrm>
+        </p:spPr>
+        <p:txBody>
+          <a:bodyPr/>
+          <a:lstStyle/>
+          <a:p>
+            <a:r>
+              <a:rPr lang="en-US" dirty="0"/>
+              <a:t>Click </a:t>
+            </a:r>
+            <a:r>
+              <a:rPr lang="en-US" i="1" dirty="0"/>
+              <a:t>Execute</a:t>
+            </a:r>
+            <a:r>
+              <a:rPr lang="en-US" dirty="0"/>
+              <a:t> to install the chosen packages.</a:t>
+            </a:r>
+          </a:p>
+        </p:txBody>
+      </p:sp>
       <p:pic>
         <p:nvPicPr>
           <p:cNvPr id="5" name="Graphic 4" descr="Line Arrow: Slight curve">
@@ -4517,7 +4998,15 @@
           <a:p>
             <a:r>
               <a:rPr lang="en-US" dirty="0"/>
-              <a:t>2.7.1. Failure</a:t>
+              <a:t>2.</a:t>
+            </a:r>
+            <a:r>
+              <a:rPr lang="lv-LV" dirty="0"/>
+              <a:t>7</a:t>
+            </a:r>
+            <a:r>
+              <a:rPr lang="en-US" dirty="0"/>
+              <a:t>.1. Failure</a:t>
             </a:r>
           </a:p>
         </p:txBody>
@@ -4586,16 +5075,17 @@
             </a:r>
             <a:r>
               <a:rPr lang="en-US" dirty="0"/>
-              <a:t> you did not install the right </a:t>
+              <a:t> you did not install all the right </a:t>
             </a:r>
             <a:r>
               <a:rPr lang="en-US" i="1" dirty="0" err="1"/>
               <a:t>vcredist</a:t>
             </a:r>
             <a:r>
-              <a:rPr lang="en-US" dirty="0"/>
+              <a:rPr lang="lv-LV" i="1" dirty="0"/>
               <a:t>.</a:t>
             </a:r>
+            <a:endParaRPr lang="en-US" sz="2400" dirty="0"/>
           </a:p>
           <a:p>
             <a:endParaRPr lang="en-US" sz="2000" dirty="0"/>
@@ -4655,7 +5145,15 @@
           <a:p>
             <a:r>
               <a:rPr lang="en-US" dirty="0"/>
-              <a:t>2.8. Wait</a:t>
+              <a:t>2.</a:t>
+            </a:r>
+            <a:r>
+              <a:rPr lang="lv-LV" dirty="0"/>
+              <a:t>8</a:t>
+            </a:r>
+            <a:r>
+              <a:rPr lang="en-US" dirty="0"/>
+              <a:t>. Wait</a:t>
             </a:r>
           </a:p>
         </p:txBody>
@@ -4753,10 +5251,10 @@
       </p:sp>
       <p:pic>
         <p:nvPicPr>
-          <p:cNvPr id="4" name="Picture 3">
-            <a:extLst>
-              <a:ext uri="{FF2B5EF4-FFF2-40B4-BE49-F238E27FC236}">
-                <a16:creationId xmlns:a16="http://schemas.microsoft.com/office/drawing/2014/main" id="{B330FC89-544E-4F24-89BC-946116432BE2}"/>
+          <p:cNvPr id="7" name="Picture 6">
+            <a:extLst>
+              <a:ext uri="{FF2B5EF4-FFF2-40B4-BE49-F238E27FC236}">
+                <a16:creationId xmlns:a16="http://schemas.microsoft.com/office/drawing/2014/main" id="{3D31AADE-D21F-4E5C-A82F-368D14A6A7A0}"/>
               </a:ext>
             </a:extLst>
           </p:cNvPr>
@@ -4773,8 +5271,8 @@
         </p:blipFill>
         <p:spPr>
           <a:xfrm>
-            <a:off x="5097049" y="1768415"/>
-            <a:ext cx="6510640" cy="4934216"/>
+            <a:off x="5124092" y="1808373"/>
+            <a:ext cx="6394661" cy="4819738"/>
           </a:xfrm>
           <a:prstGeom prst="rect">
             <a:avLst/>
@@ -4834,7 +5332,15 @@
           <a:p>
             <a:r>
               <a:rPr lang="en-US" dirty="0"/>
-              <a:t>2.9. Product Configuration</a:t>
+              <a:t>2.</a:t>
+            </a:r>
+            <a:r>
+              <a:rPr lang="lv-LV" dirty="0"/>
+              <a:t>9</a:t>
+            </a:r>
+            <a:r>
+              <a:rPr lang="en-US" dirty="0"/>
+              <a:t>. Product Configuration</a:t>
             </a:r>
           </a:p>
         </p:txBody>
@@ -4882,17 +5388,17 @@
             </a:r>
             <a:r>
               <a:rPr lang="en-US" dirty="0"/>
-              <a:t>to configure MySQL Server and MySQL Router.</a:t>
+              <a:t>to configure MySQL Server.</a:t>
             </a:r>
           </a:p>
         </p:txBody>
       </p:sp>
       <p:pic>
         <p:nvPicPr>
-          <p:cNvPr id="4" name="Picture 3">
-            <a:extLst>
-              <a:ext uri="{FF2B5EF4-FFF2-40B4-BE49-F238E27FC236}">
-                <a16:creationId xmlns:a16="http://schemas.microsoft.com/office/drawing/2014/main" id="{821586F4-6F08-4F00-B4EB-B375751D8A5C}"/>
+          <p:cNvPr id="5" name="Picture 4">
+            <a:extLst>
+              <a:ext uri="{FF2B5EF4-FFF2-40B4-BE49-F238E27FC236}">
+                <a16:creationId xmlns:a16="http://schemas.microsoft.com/office/drawing/2014/main" id="{DDC92127-7C85-4710-B0E1-59036D56748B}"/>
               </a:ext>
             </a:extLst>
           </p:cNvPr>
@@ -4909,8 +5415,8 @@
         </p:blipFill>
         <p:spPr>
           <a:xfrm>
-            <a:off x="5096055" y="1765243"/>
-            <a:ext cx="6499544" cy="4937760"/>
+            <a:off x="5104679" y="1794291"/>
+            <a:ext cx="6407276" cy="4837176"/>
           </a:xfrm>
           <a:prstGeom prst="rect">
             <a:avLst/>
@@ -4996,7 +5502,65 @@
           <a:bodyPr/>
           <a:lstStyle/>
           <a:p>
-            <a:endParaRPr lang="en-US"/>
+            <a:pPr marL="0" indent="0">
+              <a:buNone/>
+            </a:pPr>
+            <a:r>
+              <a:rPr lang="lv-LV" u="sng" dirty="0"/>
+              <a:t>FYI</a:t>
+            </a:r>
+            <a:r>
+              <a:rPr lang="lv-LV" dirty="0"/>
+              <a:t>: </a:t>
+            </a:r>
+            <a:r>
+              <a:rPr lang="en-US" dirty="0"/>
+              <a:t>On Windows, </a:t>
+            </a:r>
+            <a:r>
+              <a:rPr lang="en-US" b="1" i="1" dirty="0"/>
+              <a:t>MySQL Installer </a:t>
+            </a:r>
+            <a:r>
+              <a:rPr lang="en-US" dirty="0"/>
+              <a:t>interacts with the user and </a:t>
+            </a:r>
+            <a:r>
+              <a:rPr lang="en-US" b="1" dirty="0"/>
+              <a:t>creates</a:t>
+            </a:r>
+            <a:r>
+              <a:rPr lang="en-US" dirty="0"/>
+              <a:t> a file named </a:t>
+            </a:r>
+            <a:r>
+              <a:rPr lang="en-US" b="1" i="1" dirty="0"/>
+              <a:t>my.ini</a:t>
+            </a:r>
+            <a:r>
+              <a:rPr lang="en-US" b="1" dirty="0"/>
+              <a:t> </a:t>
+            </a:r>
+            <a:r>
+              <a:rPr lang="en-US" dirty="0"/>
+              <a:t>in the base installation directory </a:t>
+            </a:r>
+            <a:r>
+              <a:rPr lang="en-US" b="1" dirty="0"/>
+              <a:t>as</a:t>
+            </a:r>
+            <a:r>
+              <a:rPr lang="en-US" dirty="0"/>
+              <a:t> </a:t>
+            </a:r>
+            <a:r>
+              <a:rPr lang="en-US" b="1" dirty="0"/>
+              <a:t>the default option file</a:t>
+            </a:r>
+            <a:r>
+              <a:rPr lang="en-US" dirty="0"/>
+              <a:t>.</a:t>
+            </a:r>
           </a:p>
         </p:txBody>
       </p:sp>
@@ -5074,7 +5638,12 @@
             <p:ph idx="1"/>
           </p:nvPr>
         </p:nvSpPr>
-        <p:spPr/>
+        <p:spPr>
+          <a:xfrm>
+            <a:off x="838200" y="1825625"/>
+            <a:ext cx="4311770" cy="4351338"/>
+          </a:xfrm>
+        </p:spPr>
         <p:txBody>
           <a:bodyPr/>
           <a:lstStyle/>
@@ -5084,7 +5653,36 @@
             </a:pPr>
             <a:r>
               <a:rPr lang="en-US" dirty="0"/>
-              <a:t>Click </a:t>
+              <a:t>Choose </a:t>
+            </a:r>
+            <a:r>
+              <a:rPr lang="en-US" i="1" dirty="0"/>
+              <a:t>Standalone MySQL Server / Classic MySQL </a:t>
+            </a:r>
+            <a:r>
+              <a:rPr lang="en-US" i="1" dirty="0" err="1"/>
+              <a:t>Replication</a:t>
+            </a:r>
+            <a:r>
+              <a:rPr lang="en-US" dirty="0" err="1"/>
+              <a:t>Click</a:t>
+            </a:r>
+            <a:r>
+              <a:rPr lang="en-US" dirty="0"/>
+              <a:t> </a:t>
+            </a:r>
+            <a:r>
+              <a:rPr lang="en-US" i="1" dirty="0"/>
+              <a:t> </a:t>
+            </a:r>
+          </a:p>
+          <a:p>
+            <a:pPr marL="0" indent="0">
+              <a:buNone/>
+            </a:pPr>
+            <a:r>
+              <a:rPr lang="en-US" dirty="0"/>
+              <a:t>and click </a:t>
             </a:r>
             <a:r>
               <a:rPr lang="en-US" i="1" dirty="0"/>
@@ -5212,8 +5810,42 @@
               <a:buNone/>
             </a:pPr>
             <a:r>
-              <a:rPr lang="en-US" dirty="0"/>
-              <a:t>Choose TCP/IP Port Number and click </a:t>
+              <a:rPr lang="lv-LV" dirty="0"/>
+              <a:t>Select </a:t>
+            </a:r>
+            <a:r>
+              <a:rPr lang="lv-LV" i="1" dirty="0"/>
+              <a:t>Config Type </a:t>
+            </a:r>
+            <a:r>
+              <a:rPr lang="lv-LV" dirty="0"/>
+              <a:t>as </a:t>
+            </a:r>
+            <a:r>
+              <a:rPr lang="lv-LV" i="1" dirty="0"/>
+              <a:t>Development Machine</a:t>
+            </a:r>
+            <a:r>
+              <a:rPr lang="lv-LV" dirty="0"/>
+              <a:t> and choose</a:t>
+            </a:r>
+            <a:r>
+              <a:rPr lang="en-US" dirty="0"/>
+              <a:t> TCP/IP Port Number</a:t>
+            </a:r>
+            <a:r>
+              <a:rPr lang="lv-LV" dirty="0"/>
+              <a:t> (can be left as default)</a:t>
+            </a:r>
+            <a:endParaRPr lang="en-US" dirty="0"/>
+          </a:p>
+          <a:p>
+            <a:pPr marL="0" indent="0">
+              <a:buNone/>
+            </a:pPr>
+            <a:r>
+              <a:rPr lang="en-US" dirty="0"/>
+              <a:t>and click </a:t>
             </a:r>
             <a:r>
               <a:rPr lang="en-US" i="1" dirty="0"/>
@@ -5298,7 +5930,7 @@
           <p:nvPr/>
         </p:nvPicPr>
         <p:blipFill rotWithShape="1">
-          <a:blip r:embed="rId2"/>
+          <a:blip r:embed="rId3"/>
           <a:srcRect l="1273" r="-1"/>
           <a:stretch/>
         </p:blipFill>
@@ -5391,7 +6023,15 @@
             </a:r>
             <a:r>
               <a:rPr lang="en-US" dirty="0"/>
-              <a:t> to run on Windows platforms. </a:t>
+              <a:t> </a:t>
+            </a:r>
+            <a:r>
+              <a:rPr lang="lv-LV" dirty="0"/>
+              <a:t>t</a:t>
+            </a:r>
+            <a:r>
+              <a:rPr lang="en-US" dirty="0"/>
+              <a:t>o run on Windows platforms. </a:t>
             </a:r>
             <a:endParaRPr lang="lv-LV" dirty="0"/>
           </a:p>
@@ -5443,13 +6083,13 @@
           <p:nvPr/>
         </p:nvPicPr>
         <p:blipFill>
-          <a:blip r:embed="rId3">
+          <a:blip r:embed="rId4">
             <a:extLst>
               <a:ext uri="{28A0092B-C50C-407E-A947-70E740481C1C}">
                 <a14:useLocalDpi xmlns:a14="http://schemas.microsoft.com/office/drawing/2010/main" val="0"/>
               </a:ext>
               <a:ext uri="{96DAC541-7B7A-43D3-8B79-37D633B846F1}">
-                <asvg:svgBlip xmlns:asvg="http://schemas.microsoft.com/office/drawing/2016/SVG/main" r:embed="rId4"/>
+                <asvg:svgBlip xmlns:asvg="http://schemas.microsoft.com/office/drawing/2016/SVG/main" r:embed="rId5"/>
               </a:ext>
             </a:extLst>
           </a:blip>
@@ -5599,7 +6239,24 @@
             </a:pPr>
             <a:r>
               <a:rPr lang="en-US" dirty="0"/>
-              <a:t>Setup the MySQL Root Password and Add Users, then click </a:t>
+              <a:t>Setup the </a:t>
+            </a:r>
+            <a:r>
+              <a:rPr lang="en-US" i="1" dirty="0"/>
+              <a:t>MySQL Root Password</a:t>
+            </a:r>
+            <a:r>
+              <a:rPr lang="en-US" dirty="0"/>
+              <a:t> and Add Users, </a:t>
+            </a:r>
+          </a:p>
+          <a:p>
+            <a:pPr marL="0" indent="0">
+              <a:buNone/>
+            </a:pPr>
+            <a:r>
+              <a:rPr lang="en-US" dirty="0"/>
+              <a:t>then click </a:t>
             </a:r>
             <a:r>
               <a:rPr lang="en-US" i="1" dirty="0"/>
@@ -5728,8 +6385,22 @@
             </a:pPr>
             <a:r>
               <a:rPr lang="en-US" dirty="0"/>
-              <a:t>Configure MySQL Server.</a:t>
-            </a:r>
+              <a:t>Configure MySQL Server as a Windows Service choosing a unique name of the instance and choose to use Standard System Account.</a:t>
+            </a:r>
+          </a:p>
+          <a:p>
+            <a:pPr marL="0" indent="0">
+              <a:buNone/>
+            </a:pPr>
+            <a:r>
+              <a:rPr lang="en-US" dirty="0"/>
+              <a:t>Click </a:t>
+            </a:r>
+            <a:r>
+              <a:rPr lang="en-US" i="1" dirty="0"/>
+              <a:t>Next.</a:t>
+            </a:r>
+            <a:endParaRPr lang="en-US" dirty="0"/>
           </a:p>
         </p:txBody>
       </p:sp>
@@ -6200,7 +6871,7 @@
           <p:cNvPr id="2" name="Title 1">
             <a:extLst>
               <a:ext uri="{FF2B5EF4-FFF2-40B4-BE49-F238E27FC236}">
-                <a16:creationId xmlns:a16="http://schemas.microsoft.com/office/drawing/2014/main" id="{47AA5F28-E205-4523-9323-32C8E451389D}"/>
+                <a16:creationId xmlns:a16="http://schemas.microsoft.com/office/drawing/2014/main" id="{06B60446-7462-42A2-9402-8BC6D19E22B8}"/>
               </a:ext>
             </a:extLst>
           </p:cNvPr>
@@ -6217,144 +6888,12 @@
           <a:lstStyle/>
           <a:p>
             <a:r>
-              <a:rPr lang="en-US" dirty="0"/>
-              <a:t>4. MySQL Router configuration</a:t>
-            </a:r>
-          </a:p>
-        </p:txBody>
-      </p:sp>
-      <p:sp>
-        <p:nvSpPr>
-          <p:cNvPr id="3" name="Content Placeholder 2">
-            <a:extLst>
-              <a:ext uri="{FF2B5EF4-FFF2-40B4-BE49-F238E27FC236}">
-                <a16:creationId xmlns:a16="http://schemas.microsoft.com/office/drawing/2014/main" id="{3CC02775-7F4D-419A-AEDE-0A771324FBFF}"/>
-              </a:ext>
-            </a:extLst>
-          </p:cNvPr>
-          <p:cNvSpPr>
-            <a:spLocks noGrp="1"/>
-          </p:cNvSpPr>
-          <p:nvPr>
-            <p:ph idx="1"/>
-          </p:nvPr>
-        </p:nvSpPr>
-        <p:spPr>
-          <a:xfrm>
-            <a:off x="838200" y="1825625"/>
-            <a:ext cx="4285891" cy="4351338"/>
-          </a:xfrm>
-        </p:spPr>
-        <p:txBody>
-          <a:bodyPr/>
-          <a:lstStyle/>
-          <a:p>
-            <a:pPr marL="0" indent="0">
-              <a:buNone/>
-            </a:pPr>
-            <a:r>
-              <a:rPr lang="en-US" dirty="0"/>
-              <a:t>After configuring the MySQL Router, </a:t>
-            </a:r>
-            <a:r>
-              <a:rPr lang="en-US" b="1" dirty="0"/>
-              <a:t>click </a:t>
-            </a:r>
-            <a:r>
-              <a:rPr lang="en-US" b="1" i="1" dirty="0"/>
-              <a:t>Finish</a:t>
-            </a:r>
-            <a:r>
-              <a:rPr lang="en-US" dirty="0"/>
-              <a:t>.</a:t>
-            </a:r>
-          </a:p>
-        </p:txBody>
-      </p:sp>
-      <p:pic>
-        <p:nvPicPr>
-          <p:cNvPr id="4" name="Picture 3">
-            <a:extLst>
-              <a:ext uri="{FF2B5EF4-FFF2-40B4-BE49-F238E27FC236}">
-                <a16:creationId xmlns:a16="http://schemas.microsoft.com/office/drawing/2014/main" id="{2D8D0B2A-ED69-46FB-A6CD-3797887D6DD3}"/>
-              </a:ext>
-            </a:extLst>
-          </p:cNvPr>
-          <p:cNvPicPr>
-            <a:picLocks noChangeAspect="1"/>
-          </p:cNvPicPr>
-          <p:nvPr/>
-        </p:nvPicPr>
-        <p:blipFill>
-          <a:blip r:embed="rId2"/>
-          <a:stretch>
-            <a:fillRect/>
-          </a:stretch>
-        </p:blipFill>
-        <p:spPr>
-          <a:xfrm>
-            <a:off x="5024347" y="1733818"/>
-            <a:ext cx="6610227" cy="4937760"/>
-          </a:xfrm>
-          <a:prstGeom prst="rect">
-            <a:avLst/>
-          </a:prstGeom>
-        </p:spPr>
-      </p:pic>
-    </p:spTree>
-    <p:extLst>
-      <p:ext uri="{BB962C8B-B14F-4D97-AF65-F5344CB8AC3E}">
-        <p14:creationId xmlns:p14="http://schemas.microsoft.com/office/powerpoint/2010/main" val="3847117517"/>
-      </p:ext>
-    </p:extLst>
-  </p:cSld>
-  <p:clrMapOvr>
-    <a:masterClrMapping/>
-  </p:clrMapOvr>
-</p:sld>
-</file>
-
-<file path=ppt/slides/slide26.xml><?xml version="1.0" encoding="utf-8"?>
-<p:sld xmlns:a="http://schemas.openxmlformats.org/drawingml/2006/main" xmlns:r="http://schemas.openxmlformats.org/officeDocument/2006/relationships" xmlns:p="http://schemas.openxmlformats.org/presentationml/2006/main">
-  <p:cSld>
-    <p:spTree>
-      <p:nvGrpSpPr>
-        <p:cNvPr id="1" name=""/>
-        <p:cNvGrpSpPr/>
-        <p:nvPr/>
-      </p:nvGrpSpPr>
-      <p:grpSpPr>
-        <a:xfrm>
-          <a:off x="0" y="0"/>
-          <a:ext cx="0" cy="0"/>
-          <a:chOff x="0" y="0"/>
-          <a:chExt cx="0" cy="0"/>
-        </a:xfrm>
-      </p:grpSpPr>
-      <p:sp>
-        <p:nvSpPr>
-          <p:cNvPr id="2" name="Title 1">
-            <a:extLst>
-              <a:ext uri="{FF2B5EF4-FFF2-40B4-BE49-F238E27FC236}">
-                <a16:creationId xmlns:a16="http://schemas.microsoft.com/office/drawing/2014/main" id="{06B60446-7462-42A2-9402-8BC6D19E22B8}"/>
-              </a:ext>
-            </a:extLst>
-          </p:cNvPr>
-          <p:cNvSpPr>
-            <a:spLocks noGrp="1"/>
-          </p:cNvSpPr>
-          <p:nvPr>
-            <p:ph type="title"/>
-          </p:nvPr>
-        </p:nvSpPr>
-        <p:spPr/>
-        <p:txBody>
-          <a:bodyPr/>
-          <a:lstStyle/>
-          <a:p>
-            <a:r>
-              <a:rPr lang="en-US" dirty="0"/>
-              <a:t>5. Installation complete!</a:t>
+              <a:rPr lang="lv-LV" dirty="0"/>
+              <a:t>4</a:t>
+            </a:r>
+            <a:r>
+              <a:rPr lang="en-US" dirty="0"/>
+              <a:t>. Installation complete!</a:t>
             </a:r>
           </a:p>
         </p:txBody>
@@ -7008,7 +7547,15 @@
             </a:pPr>
             <a:r>
               <a:rPr lang="en-US" dirty="0"/>
-              <a:t>After successful installation, </a:t>
+              <a:t>After successful installation,</a:t>
+            </a:r>
+            <a:r>
+              <a:rPr lang="lv-LV" dirty="0"/>
+              <a:t>you can</a:t>
+            </a:r>
+            <a:r>
+              <a:rPr lang="en-US" dirty="0"/>
+              <a:t> </a:t>
             </a:r>
             <a:r>
               <a:rPr lang="en-US" b="1" dirty="0"/>
@@ -8170,4 +8717,299 @@
     </a:ext>
   </a:extLst>
 </a:theme>
+</file>
+
+<file path=ppt/theme/theme2.xml><?xml version="1.0" encoding="utf-8"?>
+<a:theme xmlns:a="http://schemas.openxmlformats.org/drawingml/2006/main" name="Office Theme">
+  <a:themeElements>
+    <a:clrScheme name="Office">
+      <a:dk1>
+        <a:sysClr val="windowText" lastClr="000000"/>
+      </a:dk1>
+      <a:lt1>
+        <a:sysClr val="window" lastClr="FFFFFF"/>
+      </a:lt1>
+      <a:dk2>
+        <a:srgbClr val="44546A"/>
+      </a:dk2>
+      <a:lt2>
+        <a:srgbClr val="E7E6E6"/>
+      </a:lt2>
+      <a:accent1>
+        <a:srgbClr val="4472C4"/>
+      </a:accent1>
+      <a:accent2>
+        <a:srgbClr val="ED7D31"/>
+      </a:accent2>
+      <a:accent3>
+        <a:srgbClr val="A5A5A5"/>
+      </a:accent3>
+      <a:accent4>
+        <a:srgbClr val="FFC000"/>
+      </a:accent4>
+      <a:accent5>
+        <a:srgbClr val="5B9BD5"/>
+      </a:accent5>
+      <a:accent6>
+        <a:srgbClr val="70AD47"/>
+      </a:accent6>
+      <a:hlink>
+        <a:srgbClr val="0563C1"/>
+      </a:hlink>
+      <a:folHlink>
+        <a:srgbClr val="954F72"/>
+      </a:folHlink>
+    </a:clrScheme>
+    <a:fontScheme name="Office">
+      <a:majorFont>
+        <a:latin typeface="Calibri Light" panose="020F0302020204030204"/>
+        <a:ea typeface=""/>
+        <a:cs typeface=""/>
+        <a:font script="Jpan" typeface="游ゴシック Light"/>
+        <a:font script="Hang" typeface="맑은 고딕"/>
+        <a:font script="Hans" typeface="等线 Light"/>
+        <a:font script="Hant" typeface="新細明體"/>
+        <a:font script="Arab" typeface="Times New Roman"/>
+        <a:font script="Hebr" typeface="Times New Roman"/>
+        <a:font script="Thai" typeface="Angsana New"/>
+        <a:font script="Ethi" typeface="Nyala"/>
+        <a:font script="Beng" typeface="Vrinda"/>
+        <a:font script="Gujr" typeface="Shruti"/>
+        <a:font script="Khmr" typeface="MoolBoran"/>
+        <a:font script="Knda" typeface="Tunga"/>
+        <a:font script="Guru" typeface="Raavi"/>
+        <a:font script="Cans" typeface="Euphemia"/>
+        <a:font script="Cher" typeface="Plantagenet Cherokee"/>
+        <a:font script="Yiii" typeface="Microsoft Yi Baiti"/>
+        <a:font script="Tibt" typeface="Microsoft Himalaya"/>
+        <a:font script="Thaa" typeface="MV Boli"/>
+        <a:font script="Deva" typeface="Mangal"/>
+        <a:font script="Telu" typeface="Gautami"/>
+        <a:font script="Taml" typeface="Latha"/>
+        <a:font script="Syrc" typeface="Estrangelo Edessa"/>
+        <a:font script="Orya" typeface="Kalinga"/>
+        <a:font script="Mlym" typeface="Kartika"/>
+        <a:font script="Laoo" typeface="DokChampa"/>
+        <a:font script="Sinh" typeface="Iskoola Pota"/>
+        <a:font script="Mong" typeface="Mongolian Baiti"/>
+        <a:font script="Viet" typeface="Times New Roman"/>
+        <a:font script="Uigh" typeface="Microsoft Uighur"/>
+        <a:font script="Geor" typeface="Sylfaen"/>
+        <a:font script="Armn" typeface="Arial"/>
+        <a:font script="Bugi" typeface="Leelawadee UI"/>
+        <a:font script="Bopo" typeface="Microsoft JhengHei"/>
+        <a:font script="Java" typeface="Javanese Text"/>
+        <a:font script="Lisu" typeface="Segoe UI"/>
+        <a:font script="Mymr" typeface="Myanmar Text"/>
+        <a:font script="Nkoo" typeface="Ebrima"/>
+        <a:font script="Olck" typeface="Nirmala UI"/>
+        <a:font script="Osma" typeface="Ebrima"/>
+        <a:font script="Phag" typeface="Phagspa"/>
+        <a:font script="Syrn" typeface="Estrangelo Edessa"/>
+        <a:font script="Syrj" typeface="Estrangelo Edessa"/>
+        <a:font script="Syre" typeface="Estrangelo Edessa"/>
+        <a:font script="Sora" typeface="Nirmala UI"/>
+        <a:font script="Tale" typeface="Microsoft Tai Le"/>
+        <a:font script="Talu" typeface="Microsoft New Tai Lue"/>
+        <a:font script="Tfng" typeface="Ebrima"/>
+      </a:majorFont>
+      <a:minorFont>
+        <a:latin typeface="Calibri" panose="020F0502020204030204"/>
+        <a:ea typeface=""/>
+        <a:cs typeface=""/>
+        <a:font script="Jpan" typeface="游ゴシック"/>
+        <a:font script="Hang" typeface="맑은 고딕"/>
+        <a:font script="Hans" typeface="等线"/>
+        <a:font script="Hant" typeface="新細明體"/>
+        <a:font script="Arab" typeface="Arial"/>
+        <a:font script="Hebr" typeface="Arial"/>
+        <a:font script="Thai" typeface="Cordia New"/>
+        <a:font script="Ethi" typeface="Nyala"/>
+        <a:font script="Beng" typeface="Vrinda"/>
+        <a:font script="Gujr" typeface="Shruti"/>
+        <a:font script="Khmr" typeface="DaunPenh"/>
+        <a:font script="Knda" typeface="Tunga"/>
+        <a:font script="Guru" typeface="Raavi"/>
+        <a:font script="Cans" typeface="Euphemia"/>
+        <a:font script="Cher" typeface="Plantagenet Cherokee"/>
+        <a:font script="Yiii" typeface="Microsoft Yi Baiti"/>
+        <a:font script="Tibt" typeface="Microsoft Himalaya"/>
+        <a:font script="Thaa" typeface="MV Boli"/>
+        <a:font script="Deva" typeface="Mangal"/>
+        <a:font script="Telu" typeface="Gautami"/>
+        <a:font script="Taml" typeface="Latha"/>
+        <a:font script="Syrc" typeface="Estrangelo Edessa"/>
+        <a:font script="Orya" typeface="Kalinga"/>
+        <a:font script="Mlym" typeface="Kartika"/>
+        <a:font script="Laoo" typeface="DokChampa"/>
+        <a:font script="Sinh" typeface="Iskoola Pota"/>
+        <a:font script="Mong" typeface="Mongolian Baiti"/>
+        <a:font script="Viet" typeface="Arial"/>
+        <a:font script="Uigh" typeface="Microsoft Uighur"/>
+        <a:font script="Geor" typeface="Sylfaen"/>
+        <a:font script="Armn" typeface="Arial"/>
+        <a:font script="Bugi" typeface="Leelawadee UI"/>
+        <a:font script="Bopo" typeface="Microsoft JhengHei"/>
+        <a:font script="Java" typeface="Javanese Text"/>
+        <a:font script="Lisu" typeface="Segoe UI"/>
+        <a:font script="Mymr" typeface="Myanmar Text"/>
+        <a:font script="Nkoo" typeface="Ebrima"/>
+        <a:font script="Olck" typeface="Nirmala UI"/>
+        <a:font script="Osma" typeface="Ebrima"/>
+        <a:font script="Phag" typeface="Phagspa"/>
+        <a:font script="Syrn" typeface="Estrangelo Edessa"/>
+        <a:font script="Syrj" typeface="Estrangelo Edessa"/>
+        <a:font script="Syre" typeface="Estrangelo Edessa"/>
+        <a:font script="Sora" typeface="Nirmala UI"/>
+        <a:font script="Tale" typeface="Microsoft Tai Le"/>
+        <a:font script="Talu" typeface="Microsoft New Tai Lue"/>
+        <a:font script="Tfng" typeface="Ebrima"/>
+      </a:minorFont>
+    </a:fontScheme>
+    <a:fmtScheme name="Office">
+      <a:fillStyleLst>
+        <a:solidFill>
+          <a:schemeClr val="phClr"/>
+        </a:solidFill>
+        <a:gradFill rotWithShape="1">
+          <a:gsLst>
+            <a:gs pos="0">
+              <a:schemeClr val="phClr">
+                <a:lumMod val="110000"/>
+                <a:satMod val="105000"/>
+                <a:tint val="67000"/>
+              </a:schemeClr>
+            </a:gs>
+            <a:gs pos="50000">
+              <a:schemeClr val="phClr">
+                <a:lumMod val="105000"/>
+                <a:satMod val="103000"/>
+                <a:tint val="73000"/>
+              </a:schemeClr>
+            </a:gs>
+            <a:gs pos="100000">
+              <a:schemeClr val="phClr">
+                <a:lumMod val="105000"/>
+                <a:satMod val="109000"/>
+                <a:tint val="81000"/>
+              </a:schemeClr>
+            </a:gs>
+          </a:gsLst>
+          <a:lin ang="5400000" scaled="0"/>
+        </a:gradFill>
+        <a:gradFill rotWithShape="1">
+          <a:gsLst>
+            <a:gs pos="0">
+              <a:schemeClr val="phClr">
+                <a:satMod val="103000"/>
+                <a:lumMod val="102000"/>
+                <a:tint val="94000"/>
+              </a:schemeClr>
+            </a:gs>
+            <a:gs pos="50000">
+              <a:schemeClr val="phClr">
+                <a:satMod val="110000"/>
+                <a:lumMod val="100000"/>
+                <a:shade val="100000"/>
+              </a:schemeClr>
+            </a:gs>
+            <a:gs pos="100000">
+              <a:schemeClr val="phClr">
+                <a:lumMod val="99000"/>
+                <a:satMod val="120000"/>
+                <a:shade val="78000"/>
+              </a:schemeClr>
+            </a:gs>
+          </a:gsLst>
+          <a:lin ang="5400000" scaled="0"/>
+        </a:gradFill>
+      </a:fillStyleLst>
+      <a:lnStyleLst>
+        <a:ln w="6350" cap="flat" cmpd="sng" algn="ctr">
+          <a:solidFill>
+            <a:schemeClr val="phClr"/>
+          </a:solidFill>
+          <a:prstDash val="solid"/>
+          <a:miter lim="800000"/>
+        </a:ln>
+        <a:ln w="12700" cap="flat" cmpd="sng" algn="ctr">
+          <a:solidFill>
+            <a:schemeClr val="phClr"/>
+          </a:solidFill>
+          <a:prstDash val="solid"/>
+          <a:miter lim="800000"/>
+        </a:ln>
+        <a:ln w="19050" cap="flat" cmpd="sng" algn="ctr">
+          <a:solidFill>
+            <a:schemeClr val="phClr"/>
+          </a:solidFill>
+          <a:prstDash val="solid"/>
+          <a:miter lim="800000"/>
+        </a:ln>
+      </a:lnStyleLst>
+      <a:effectStyleLst>
+        <a:effectStyle>
+          <a:effectLst/>
+        </a:effectStyle>
+        <a:effectStyle>
+          <a:effectLst/>
+        </a:effectStyle>
+        <a:effectStyle>
+          <a:effectLst>
+            <a:outerShdw blurRad="57150" dist="19050" dir="5400000" algn="ctr" rotWithShape="0">
+              <a:srgbClr val="000000">
+                <a:alpha val="63000"/>
+              </a:srgbClr>
+            </a:outerShdw>
+          </a:effectLst>
+        </a:effectStyle>
+      </a:effectStyleLst>
+      <a:bgFillStyleLst>
+        <a:solidFill>
+          <a:schemeClr val="phClr"/>
+        </a:solidFill>
+        <a:solidFill>
+          <a:schemeClr val="phClr">
+            <a:tint val="95000"/>
+            <a:satMod val="170000"/>
+          </a:schemeClr>
+        </a:solidFill>
+        <a:gradFill rotWithShape="1">
+          <a:gsLst>
+            <a:gs pos="0">
+              <a:schemeClr val="phClr">
+                <a:tint val="93000"/>
+                <a:satMod val="150000"/>
+                <a:shade val="98000"/>
+                <a:lumMod val="102000"/>
+              </a:schemeClr>
+            </a:gs>
+            <a:gs pos="50000">
+              <a:schemeClr val="phClr">
+                <a:tint val="98000"/>
+                <a:satMod val="130000"/>
+                <a:shade val="90000"/>
+                <a:lumMod val="103000"/>
+              </a:schemeClr>
+            </a:gs>
+            <a:gs pos="100000">
+              <a:schemeClr val="phClr">
+                <a:shade val="63000"/>
+                <a:satMod val="120000"/>
+              </a:schemeClr>
+            </a:gs>
+          </a:gsLst>
+          <a:lin ang="5400000" scaled="0"/>
+        </a:gradFill>
+      </a:bgFillStyleLst>
+    </a:fmtScheme>
+  </a:themeElements>
+  <a:objectDefaults/>
+  <a:extraClrSchemeLst/>
+  <a:extLst>
+    <a:ext uri="{05A4C25C-085E-4340-85A3-A5531E510DB2}">
+      <thm15:themeFamily xmlns:thm15="http://schemas.microsoft.com/office/thememl/2012/main" name="Office Theme" id="{62F939B6-93AF-4DB8-9C6B-D6C7DFDC589F}" vid="{4A3C46E8-61CC-4603-A589-7422A47A8E4A}"/>
+    </a:ext>
+  </a:extLst>
+</a:theme>
 </file>
</xml_diff>